<commit_message>
Update to addd VPAM and VMAM capacitors
</commit_message>
<xml_diff>
--- a/docs/Aureo_Figures.pptx
+++ b/docs/Aureo_Figures.pptx
@@ -35,6 +35,10 @@
     <p:sldId id="258" r:id="rId29"/>
     <p:sldId id="259" r:id="rId30"/>
     <p:sldId id="260" r:id="rId31"/>
+    <p:sldId id="291" r:id="rId32"/>
+    <p:sldId id="293" r:id="rId33"/>
+    <p:sldId id="294" r:id="rId34"/>
+    <p:sldId id="292" r:id="rId35"/>
   </p:sldIdLst>
   <p:sldSz cx="12192000" cy="6858000"/>
   <p:notesSz cx="6858000" cy="9144000"/>
@@ -288,7 +292,7 @@
           <a:p>
             <a:fld id="{BB7A6D71-9ECB-4AA2-98FB-BF63E2446406}" type="datetimeFigureOut">
               <a:rPr lang="en-US" smtClean="0"/>
-              <a:t>6/7/2023</a:t>
+              <a:t>12/15/2023</a:t>
             </a:fld>
             <a:endParaRPr lang="en-US"/>
           </a:p>
@@ -486,7 +490,7 @@
           <a:p>
             <a:fld id="{BB7A6D71-9ECB-4AA2-98FB-BF63E2446406}" type="datetimeFigureOut">
               <a:rPr lang="en-US" smtClean="0"/>
-              <a:t>6/7/2023</a:t>
+              <a:t>12/15/2023</a:t>
             </a:fld>
             <a:endParaRPr lang="en-US"/>
           </a:p>
@@ -694,7 +698,7 @@
           <a:p>
             <a:fld id="{BB7A6D71-9ECB-4AA2-98FB-BF63E2446406}" type="datetimeFigureOut">
               <a:rPr lang="en-US" smtClean="0"/>
-              <a:t>6/7/2023</a:t>
+              <a:t>12/15/2023</a:t>
             </a:fld>
             <a:endParaRPr lang="en-US"/>
           </a:p>
@@ -892,7 +896,7 @@
           <a:p>
             <a:fld id="{BB7A6D71-9ECB-4AA2-98FB-BF63E2446406}" type="datetimeFigureOut">
               <a:rPr lang="en-US" smtClean="0"/>
-              <a:t>6/7/2023</a:t>
+              <a:t>12/15/2023</a:t>
             </a:fld>
             <a:endParaRPr lang="en-US"/>
           </a:p>
@@ -1167,7 +1171,7 @@
           <a:p>
             <a:fld id="{BB7A6D71-9ECB-4AA2-98FB-BF63E2446406}" type="datetimeFigureOut">
               <a:rPr lang="en-US" smtClean="0"/>
-              <a:t>6/7/2023</a:t>
+              <a:t>12/15/2023</a:t>
             </a:fld>
             <a:endParaRPr lang="en-US"/>
           </a:p>
@@ -1432,7 +1436,7 @@
           <a:p>
             <a:fld id="{BB7A6D71-9ECB-4AA2-98FB-BF63E2446406}" type="datetimeFigureOut">
               <a:rPr lang="en-US" smtClean="0"/>
-              <a:t>6/7/2023</a:t>
+              <a:t>12/15/2023</a:t>
             </a:fld>
             <a:endParaRPr lang="en-US"/>
           </a:p>
@@ -1844,7 +1848,7 @@
           <a:p>
             <a:fld id="{BB7A6D71-9ECB-4AA2-98FB-BF63E2446406}" type="datetimeFigureOut">
               <a:rPr lang="en-US" smtClean="0"/>
-              <a:t>6/7/2023</a:t>
+              <a:t>12/15/2023</a:t>
             </a:fld>
             <a:endParaRPr lang="en-US"/>
           </a:p>
@@ -1985,7 +1989,7 @@
           <a:p>
             <a:fld id="{BB7A6D71-9ECB-4AA2-98FB-BF63E2446406}" type="datetimeFigureOut">
               <a:rPr lang="en-US" smtClean="0"/>
-              <a:t>6/7/2023</a:t>
+              <a:t>12/15/2023</a:t>
             </a:fld>
             <a:endParaRPr lang="en-US"/>
           </a:p>
@@ -2098,7 +2102,7 @@
           <a:p>
             <a:fld id="{BB7A6D71-9ECB-4AA2-98FB-BF63E2446406}" type="datetimeFigureOut">
               <a:rPr lang="en-US" smtClean="0"/>
-              <a:t>6/7/2023</a:t>
+              <a:t>12/15/2023</a:t>
             </a:fld>
             <a:endParaRPr lang="en-US"/>
           </a:p>
@@ -2409,7 +2413,7 @@
           <a:p>
             <a:fld id="{BB7A6D71-9ECB-4AA2-98FB-BF63E2446406}" type="datetimeFigureOut">
               <a:rPr lang="en-US" smtClean="0"/>
-              <a:t>6/7/2023</a:t>
+              <a:t>12/15/2023</a:t>
             </a:fld>
             <a:endParaRPr lang="en-US"/>
           </a:p>
@@ -2697,7 +2701,7 @@
           <a:p>
             <a:fld id="{BB7A6D71-9ECB-4AA2-98FB-BF63E2446406}" type="datetimeFigureOut">
               <a:rPr lang="en-US" smtClean="0"/>
-              <a:t>6/7/2023</a:t>
+              <a:t>12/15/2023</a:t>
             </a:fld>
             <a:endParaRPr lang="en-US"/>
           </a:p>
@@ -2938,7 +2942,7 @@
           <a:p>
             <a:fld id="{BB7A6D71-9ECB-4AA2-98FB-BF63E2446406}" type="datetimeFigureOut">
               <a:rPr lang="en-US" smtClean="0"/>
-              <a:t>6/7/2023</a:t>
+              <a:t>12/15/2023</a:t>
             </a:fld>
             <a:endParaRPr lang="en-US"/>
           </a:p>
@@ -3690,8 +3694,8 @@
         </p:nvSpPr>
         <p:spPr>
           <a:xfrm>
-            <a:off x="2225231" y="1694563"/>
-            <a:ext cx="7433610" cy="342786"/>
+            <a:off x="2225231" y="1718533"/>
+            <a:ext cx="7433610" cy="318815"/>
           </a:xfrm>
           <a:prstGeom prst="rect">
             <a:avLst/>
@@ -3822,8 +3826,8 @@
         </p:nvSpPr>
         <p:spPr>
           <a:xfrm>
-            <a:off x="2225231" y="1351777"/>
-            <a:ext cx="7433610" cy="342786"/>
+            <a:off x="2225231" y="1351776"/>
+            <a:ext cx="7433610" cy="366755"/>
           </a:xfrm>
           <a:prstGeom prst="rect">
             <a:avLst/>
@@ -3910,7 +3914,7 @@
                 <a:latin typeface="Arial" panose="020B0604020202020204" pitchFamily="34" charset="0"/>
                 <a:cs typeface="Arial" panose="020B0604020202020204" pitchFamily="34" charset="0"/>
               </a:rPr>
-              <a:t>0.5 µm</a:t>
+              <a:t>0.2 µm</a:t>
             </a:r>
           </a:p>
         </p:txBody>
@@ -3951,7 +3955,7 @@
                 <a:latin typeface="Arial" panose="020B0604020202020204" pitchFamily="34" charset="0"/>
                 <a:cs typeface="Arial" panose="020B0604020202020204" pitchFamily="34" charset="0"/>
               </a:rPr>
-              <a:t>1 µm</a:t>
+              <a:t>0.5 µm</a:t>
             </a:r>
           </a:p>
         </p:txBody>
@@ -3992,7 +3996,7 @@
                 <a:latin typeface="Arial" panose="020B0604020202020204" pitchFamily="34" charset="0"/>
                 <a:cs typeface="Arial" panose="020B0604020202020204" pitchFamily="34" charset="0"/>
               </a:rPr>
-              <a:t>1 µm</a:t>
+              <a:t>0.65 µm</a:t>
             </a:r>
           </a:p>
         </p:txBody>
@@ -4671,8 +4675,8 @@
         </p:nvSpPr>
         <p:spPr>
           <a:xfrm>
-            <a:off x="5288957" y="1245224"/>
-            <a:ext cx="245125" cy="337668"/>
+            <a:off x="5307368" y="1243013"/>
+            <a:ext cx="245125" cy="329752"/>
           </a:xfrm>
           <a:prstGeom prst="rect">
             <a:avLst/>
@@ -9729,6 +9733,468 @@
           </a:p>
         </p:txBody>
       </p:sp>
+      <p:sp>
+        <p:nvSpPr>
+          <p:cNvPr id="9" name="Rectangle 8">
+            <a:extLst>
+              <a:ext uri="{FF2B5EF4-FFF2-40B4-BE49-F238E27FC236}">
+                <a16:creationId xmlns:a16="http://schemas.microsoft.com/office/drawing/2014/main" id="{9A3D4B05-75E3-326C-F3F9-F1B73ED23D7A}"/>
+              </a:ext>
+            </a:extLst>
+          </p:cNvPr>
+          <p:cNvSpPr/>
+          <p:nvPr/>
+        </p:nvSpPr>
+        <p:spPr>
+          <a:xfrm>
+            <a:off x="321675" y="3623812"/>
+            <a:ext cx="4716372" cy="342786"/>
+          </a:xfrm>
+          <a:prstGeom prst="rect">
+            <a:avLst/>
+          </a:prstGeom>
+          <a:solidFill>
+            <a:schemeClr val="accent2">
+              <a:lumMod val="40000"/>
+              <a:lumOff val="60000"/>
+            </a:schemeClr>
+          </a:solidFill>
+          <a:ln w="6350">
+            <a:solidFill>
+              <a:schemeClr val="tx1"/>
+            </a:solidFill>
+          </a:ln>
+        </p:spPr>
+        <p:style>
+          <a:lnRef idx="2">
+            <a:schemeClr val="accent1">
+              <a:shade val="50000"/>
+            </a:schemeClr>
+          </a:lnRef>
+          <a:fillRef idx="1">
+            <a:schemeClr val="accent1"/>
+          </a:fillRef>
+          <a:effectRef idx="0">
+            <a:schemeClr val="accent1"/>
+          </a:effectRef>
+          <a:fontRef idx="minor">
+            <a:schemeClr val="lt1"/>
+          </a:fontRef>
+        </p:style>
+        <p:txBody>
+          <a:bodyPr rtlCol="0" anchor="ctr"/>
+          <a:lstStyle/>
+          <a:p>
+            <a:pPr algn="ctr"/>
+            <a:r>
+              <a:rPr lang="en-US" sz="1600" dirty="0">
+                <a:solidFill>
+                  <a:schemeClr val="tx1"/>
+                </a:solidFill>
+                <a:latin typeface="Arial" panose="020B0604020202020204" pitchFamily="34" charset="0"/>
+                <a:cs typeface="Arial" panose="020B0604020202020204" pitchFamily="34" charset="0"/>
+              </a:rPr>
+              <a:t>POLY1</a:t>
+            </a:r>
+          </a:p>
+        </p:txBody>
+      </p:sp>
+      <p:sp>
+        <p:nvSpPr>
+          <p:cNvPr id="16" name="Rectangle 15">
+            <a:extLst>
+              <a:ext uri="{FF2B5EF4-FFF2-40B4-BE49-F238E27FC236}">
+                <a16:creationId xmlns:a16="http://schemas.microsoft.com/office/drawing/2014/main" id="{CE2404A5-5442-5DB7-4310-FACB62806024}"/>
+              </a:ext>
+            </a:extLst>
+          </p:cNvPr>
+          <p:cNvSpPr/>
+          <p:nvPr/>
+        </p:nvSpPr>
+        <p:spPr>
+          <a:xfrm>
+            <a:off x="416560" y="3966597"/>
+            <a:ext cx="4470948" cy="220455"/>
+          </a:xfrm>
+          <a:prstGeom prst="rect">
+            <a:avLst/>
+          </a:prstGeom>
+          <a:solidFill>
+            <a:schemeClr val="accent6">
+              <a:lumMod val="40000"/>
+              <a:lumOff val="60000"/>
+            </a:schemeClr>
+          </a:solidFill>
+          <a:ln w="6350">
+            <a:solidFill>
+              <a:schemeClr val="tx1"/>
+            </a:solidFill>
+          </a:ln>
+        </p:spPr>
+        <p:style>
+          <a:lnRef idx="2">
+            <a:schemeClr val="accent1">
+              <a:shade val="50000"/>
+            </a:schemeClr>
+          </a:lnRef>
+          <a:fillRef idx="1">
+            <a:schemeClr val="accent1"/>
+          </a:fillRef>
+          <a:effectRef idx="0">
+            <a:schemeClr val="accent1"/>
+          </a:effectRef>
+          <a:fontRef idx="minor">
+            <a:schemeClr val="lt1"/>
+          </a:fontRef>
+        </p:style>
+        <p:txBody>
+          <a:bodyPr rtlCol="0" anchor="ctr"/>
+          <a:lstStyle/>
+          <a:p>
+            <a:pPr algn="ctr"/>
+            <a:r>
+              <a:rPr lang="en-US" sz="1600" dirty="0">
+                <a:solidFill>
+                  <a:schemeClr val="tx1"/>
+                </a:solidFill>
+                <a:latin typeface="Arial" panose="020B0604020202020204" pitchFamily="34" charset="0"/>
+                <a:cs typeface="Arial" panose="020B0604020202020204" pitchFamily="34" charset="0"/>
+              </a:rPr>
+              <a:t>NITRIDE</a:t>
+            </a:r>
+          </a:p>
+        </p:txBody>
+      </p:sp>
+      <p:sp>
+        <p:nvSpPr>
+          <p:cNvPr id="22" name="Rectangle 21">
+            <a:extLst>
+              <a:ext uri="{FF2B5EF4-FFF2-40B4-BE49-F238E27FC236}">
+                <a16:creationId xmlns:a16="http://schemas.microsoft.com/office/drawing/2014/main" id="{E30B88E1-811D-783F-D599-399C46B40E3C}"/>
+              </a:ext>
+            </a:extLst>
+          </p:cNvPr>
+          <p:cNvSpPr/>
+          <p:nvPr/>
+        </p:nvSpPr>
+        <p:spPr>
+          <a:xfrm>
+            <a:off x="319132" y="3281940"/>
+            <a:ext cx="4659268" cy="342786"/>
+          </a:xfrm>
+          <a:prstGeom prst="rect">
+            <a:avLst/>
+          </a:prstGeom>
+          <a:solidFill>
+            <a:schemeClr val="accent4">
+              <a:lumMod val="40000"/>
+              <a:lumOff val="60000"/>
+            </a:schemeClr>
+          </a:solidFill>
+          <a:ln w="6350">
+            <a:solidFill>
+              <a:schemeClr val="tx1"/>
+            </a:solidFill>
+          </a:ln>
+        </p:spPr>
+        <p:style>
+          <a:lnRef idx="2">
+            <a:schemeClr val="accent1">
+              <a:shade val="50000"/>
+            </a:schemeClr>
+          </a:lnRef>
+          <a:fillRef idx="1">
+            <a:schemeClr val="accent1"/>
+          </a:fillRef>
+          <a:effectRef idx="0">
+            <a:schemeClr val="accent1"/>
+          </a:effectRef>
+          <a:fontRef idx="minor">
+            <a:schemeClr val="lt1"/>
+          </a:fontRef>
+        </p:style>
+        <p:txBody>
+          <a:bodyPr rtlCol="0" anchor="ctr"/>
+          <a:lstStyle/>
+          <a:p>
+            <a:pPr algn="ctr"/>
+            <a:r>
+              <a:rPr lang="en-US" sz="1600" dirty="0">
+                <a:solidFill>
+                  <a:schemeClr val="tx1"/>
+                </a:solidFill>
+                <a:latin typeface="Arial" panose="020B0604020202020204" pitchFamily="34" charset="0"/>
+                <a:cs typeface="Arial" panose="020B0604020202020204" pitchFamily="34" charset="0"/>
+              </a:rPr>
+              <a:t>METAL1</a:t>
+            </a:r>
+          </a:p>
+        </p:txBody>
+      </p:sp>
+      <p:sp>
+        <p:nvSpPr>
+          <p:cNvPr id="23" name="Rectangle 22">
+            <a:extLst>
+              <a:ext uri="{FF2B5EF4-FFF2-40B4-BE49-F238E27FC236}">
+                <a16:creationId xmlns:a16="http://schemas.microsoft.com/office/drawing/2014/main" id="{F324411E-CFCC-F0AB-386A-3C5261191D24}"/>
+              </a:ext>
+            </a:extLst>
+          </p:cNvPr>
+          <p:cNvSpPr/>
+          <p:nvPr/>
+        </p:nvSpPr>
+        <p:spPr>
+          <a:xfrm>
+            <a:off x="321674" y="4184475"/>
+            <a:ext cx="5017406" cy="873300"/>
+          </a:xfrm>
+          <a:prstGeom prst="rect">
+            <a:avLst/>
+          </a:prstGeom>
+          <a:solidFill>
+            <a:schemeClr val="accent3">
+              <a:lumMod val="40000"/>
+              <a:lumOff val="60000"/>
+            </a:schemeClr>
+          </a:solidFill>
+          <a:ln w="6350">
+            <a:solidFill>
+              <a:schemeClr val="tx1"/>
+            </a:solidFill>
+          </a:ln>
+        </p:spPr>
+        <p:style>
+          <a:lnRef idx="2">
+            <a:schemeClr val="accent1">
+              <a:shade val="50000"/>
+            </a:schemeClr>
+          </a:lnRef>
+          <a:fillRef idx="1">
+            <a:schemeClr val="accent1"/>
+          </a:fillRef>
+          <a:effectRef idx="0">
+            <a:schemeClr val="accent1"/>
+          </a:effectRef>
+          <a:fontRef idx="minor">
+            <a:schemeClr val="lt1"/>
+          </a:fontRef>
+        </p:style>
+        <p:txBody>
+          <a:bodyPr rtlCol="0" anchor="ctr"/>
+          <a:lstStyle/>
+          <a:p>
+            <a:pPr algn="ctr"/>
+            <a:r>
+              <a:rPr lang="en-US" sz="1600" dirty="0">
+                <a:solidFill>
+                  <a:schemeClr val="tx1"/>
+                </a:solidFill>
+                <a:latin typeface="Arial" panose="020B0604020202020204" pitchFamily="34" charset="0"/>
+                <a:cs typeface="Arial" panose="020B0604020202020204" pitchFamily="34" charset="0"/>
+              </a:rPr>
+              <a:t>SOI1</a:t>
+            </a:r>
+          </a:p>
+        </p:txBody>
+      </p:sp>
+      <p:sp>
+        <p:nvSpPr>
+          <p:cNvPr id="28" name="Rectangle 27">
+            <a:extLst>
+              <a:ext uri="{FF2B5EF4-FFF2-40B4-BE49-F238E27FC236}">
+                <a16:creationId xmlns:a16="http://schemas.microsoft.com/office/drawing/2014/main" id="{330FAD56-7956-DC54-7D5E-C36A97165DDF}"/>
+              </a:ext>
+            </a:extLst>
+          </p:cNvPr>
+          <p:cNvSpPr/>
+          <p:nvPr/>
+        </p:nvSpPr>
+        <p:spPr>
+          <a:xfrm rot="10800000" flipV="1">
+            <a:off x="2699258" y="2376012"/>
+            <a:ext cx="2188248" cy="220455"/>
+          </a:xfrm>
+          <a:prstGeom prst="rect">
+            <a:avLst/>
+          </a:prstGeom>
+          <a:solidFill>
+            <a:schemeClr val="accent6">
+              <a:lumMod val="40000"/>
+              <a:lumOff val="60000"/>
+            </a:schemeClr>
+          </a:solidFill>
+          <a:ln w="6350">
+            <a:solidFill>
+              <a:schemeClr val="tx1"/>
+            </a:solidFill>
+          </a:ln>
+        </p:spPr>
+        <p:style>
+          <a:lnRef idx="2">
+            <a:schemeClr val="accent1">
+              <a:shade val="50000"/>
+            </a:schemeClr>
+          </a:lnRef>
+          <a:fillRef idx="1">
+            <a:schemeClr val="accent1"/>
+          </a:fillRef>
+          <a:effectRef idx="0">
+            <a:schemeClr val="accent1"/>
+          </a:effectRef>
+          <a:fontRef idx="minor">
+            <a:schemeClr val="lt1"/>
+          </a:fontRef>
+        </p:style>
+        <p:txBody>
+          <a:bodyPr rtlCol="0" anchor="ctr"/>
+          <a:lstStyle/>
+          <a:p>
+            <a:pPr algn="ctr"/>
+            <a:r>
+              <a:rPr lang="en-US" sz="1600" dirty="0">
+                <a:solidFill>
+                  <a:schemeClr val="tx1"/>
+                </a:solidFill>
+                <a:latin typeface="Arial" panose="020B0604020202020204" pitchFamily="34" charset="0"/>
+                <a:cs typeface="Arial" panose="020B0604020202020204" pitchFamily="34" charset="0"/>
+              </a:rPr>
+              <a:t>NITRIDE</a:t>
+            </a:r>
+          </a:p>
+        </p:txBody>
+      </p:sp>
+      <p:sp>
+        <p:nvSpPr>
+          <p:cNvPr id="29" name="Rectangle 28">
+            <a:extLst>
+              <a:ext uri="{FF2B5EF4-FFF2-40B4-BE49-F238E27FC236}">
+                <a16:creationId xmlns:a16="http://schemas.microsoft.com/office/drawing/2014/main" id="{FC93825F-C14D-7E85-0DFD-57ACFB601C65}"/>
+              </a:ext>
+            </a:extLst>
+          </p:cNvPr>
+          <p:cNvSpPr/>
+          <p:nvPr/>
+        </p:nvSpPr>
+        <p:spPr>
+          <a:xfrm rot="10800000" flipV="1">
+            <a:off x="2621815" y="2600627"/>
+            <a:ext cx="2411149" cy="342786"/>
+          </a:xfrm>
+          <a:prstGeom prst="rect">
+            <a:avLst/>
+          </a:prstGeom>
+          <a:solidFill>
+            <a:schemeClr val="accent2">
+              <a:lumMod val="40000"/>
+              <a:lumOff val="60000"/>
+            </a:schemeClr>
+          </a:solidFill>
+          <a:ln w="6350">
+            <a:solidFill>
+              <a:schemeClr val="tx1"/>
+            </a:solidFill>
+          </a:ln>
+        </p:spPr>
+        <p:style>
+          <a:lnRef idx="2">
+            <a:schemeClr val="accent1">
+              <a:shade val="50000"/>
+            </a:schemeClr>
+          </a:lnRef>
+          <a:fillRef idx="1">
+            <a:schemeClr val="accent1"/>
+          </a:fillRef>
+          <a:effectRef idx="0">
+            <a:schemeClr val="accent1"/>
+          </a:effectRef>
+          <a:fontRef idx="minor">
+            <a:schemeClr val="lt1"/>
+          </a:fontRef>
+        </p:style>
+        <p:txBody>
+          <a:bodyPr rtlCol="0" anchor="ctr"/>
+          <a:lstStyle/>
+          <a:p>
+            <a:pPr algn="ctr"/>
+            <a:r>
+              <a:rPr lang="en-US" sz="1600" dirty="0">
+                <a:solidFill>
+                  <a:schemeClr val="tx1"/>
+                </a:solidFill>
+                <a:latin typeface="Arial" panose="020B0604020202020204" pitchFamily="34" charset="0"/>
+                <a:cs typeface="Arial" panose="020B0604020202020204" pitchFamily="34" charset="0"/>
+              </a:rPr>
+              <a:t>POLY2</a:t>
+            </a:r>
+          </a:p>
+        </p:txBody>
+      </p:sp>
+      <p:sp>
+        <p:nvSpPr>
+          <p:cNvPr id="30" name="Rectangle 29">
+            <a:extLst>
+              <a:ext uri="{FF2B5EF4-FFF2-40B4-BE49-F238E27FC236}">
+                <a16:creationId xmlns:a16="http://schemas.microsoft.com/office/drawing/2014/main" id="{5FB8BA43-4C3D-8A13-8403-EC6D76DC3685}"/>
+              </a:ext>
+            </a:extLst>
+          </p:cNvPr>
+          <p:cNvSpPr/>
+          <p:nvPr/>
+        </p:nvSpPr>
+        <p:spPr>
+          <a:xfrm rot="10800000" flipV="1">
+            <a:off x="2654597" y="2938837"/>
+            <a:ext cx="2323801" cy="342786"/>
+          </a:xfrm>
+          <a:prstGeom prst="rect">
+            <a:avLst/>
+          </a:prstGeom>
+          <a:solidFill>
+            <a:schemeClr val="accent4">
+              <a:lumMod val="40000"/>
+              <a:lumOff val="60000"/>
+            </a:schemeClr>
+          </a:solidFill>
+          <a:ln w="6350">
+            <a:solidFill>
+              <a:schemeClr val="tx1"/>
+            </a:solidFill>
+          </a:ln>
+        </p:spPr>
+        <p:style>
+          <a:lnRef idx="2">
+            <a:schemeClr val="accent1">
+              <a:shade val="50000"/>
+            </a:schemeClr>
+          </a:lnRef>
+          <a:fillRef idx="1">
+            <a:schemeClr val="accent1"/>
+          </a:fillRef>
+          <a:effectRef idx="0">
+            <a:schemeClr val="accent1"/>
+          </a:effectRef>
+          <a:fontRef idx="minor">
+            <a:schemeClr val="lt1"/>
+          </a:fontRef>
+        </p:style>
+        <p:txBody>
+          <a:bodyPr rtlCol="0" anchor="ctr"/>
+          <a:lstStyle/>
+          <a:p>
+            <a:pPr algn="ctr"/>
+            <a:r>
+              <a:rPr lang="en-US" sz="1600" dirty="0">
+                <a:solidFill>
+                  <a:schemeClr val="tx1"/>
+                </a:solidFill>
+                <a:latin typeface="Arial" panose="020B0604020202020204" pitchFamily="34" charset="0"/>
+                <a:cs typeface="Arial" panose="020B0604020202020204" pitchFamily="34" charset="0"/>
+              </a:rPr>
+              <a:t>METAL2</a:t>
+            </a:r>
+          </a:p>
+        </p:txBody>
+      </p:sp>
     </p:spTree>
     <p:extLst>
       <p:ext uri="{BB962C8B-B14F-4D97-AF65-F5344CB8AC3E}">
@@ -16857,13 +17323,15 @@
               </a:ext>
             </a:extLst>
           </p:cNvPr>
-          <p:cNvCxnSpPr/>
+          <p:cNvCxnSpPr>
+            <a:cxnSpLocks/>
+          </p:cNvCxnSpPr>
           <p:nvPr/>
         </p:nvCxnSpPr>
         <p:spPr>
           <a:xfrm>
-            <a:off x="10661344" y="1019738"/>
-            <a:ext cx="0" cy="1526043"/>
+            <a:off x="10701826" y="1705310"/>
+            <a:ext cx="0" cy="840471"/>
           </a:xfrm>
           <a:prstGeom prst="straightConnector1">
             <a:avLst/>
@@ -16891,12 +17359,57 @@
           </a:fontRef>
         </p:style>
       </p:cxnSp>
-      <p:sp>
-        <p:nvSpPr>
-          <p:cNvPr id="34" name="TextBox 33">
-            <a:extLst>
-              <a:ext uri="{FF2B5EF4-FFF2-40B4-BE49-F238E27FC236}">
-                <a16:creationId xmlns:a16="http://schemas.microsoft.com/office/drawing/2014/main" id="{6FD0C8EB-5C76-184B-E7DC-9862583D5089}"/>
+      <p:cxnSp>
+        <p:nvCxnSpPr>
+          <p:cNvPr id="35" name="Straight Arrow Connector 34">
+            <a:extLst>
+              <a:ext uri="{FF2B5EF4-FFF2-40B4-BE49-F238E27FC236}">
+                <a16:creationId xmlns:a16="http://schemas.microsoft.com/office/drawing/2014/main" id="{8B20B7B4-169E-1196-2E8D-405F04FED9B3}"/>
+              </a:ext>
+            </a:extLst>
+          </p:cNvPr>
+          <p:cNvCxnSpPr>
+            <a:cxnSpLocks/>
+          </p:cNvCxnSpPr>
+          <p:nvPr/>
+        </p:nvCxnSpPr>
+        <p:spPr>
+          <a:xfrm>
+            <a:off x="8082736" y="3429000"/>
+            <a:ext cx="0" cy="3055620"/>
+          </a:xfrm>
+          <a:prstGeom prst="straightConnector1">
+            <a:avLst/>
+          </a:prstGeom>
+          <a:ln>
+            <a:solidFill>
+              <a:schemeClr val="tx1"/>
+            </a:solidFill>
+            <a:headEnd type="triangle"/>
+            <a:tailEnd type="triangle"/>
+          </a:ln>
+        </p:spPr>
+        <p:style>
+          <a:lnRef idx="1">
+            <a:schemeClr val="accent1"/>
+          </a:lnRef>
+          <a:fillRef idx="0">
+            <a:schemeClr val="accent1"/>
+          </a:fillRef>
+          <a:effectRef idx="0">
+            <a:schemeClr val="accent1"/>
+          </a:effectRef>
+          <a:fontRef idx="minor">
+            <a:schemeClr val="tx1"/>
+          </a:fontRef>
+        </p:style>
+      </p:cxnSp>
+      <p:sp>
+        <p:nvSpPr>
+          <p:cNvPr id="37" name="TextBox 36">
+            <a:extLst>
+              <a:ext uri="{FF2B5EF4-FFF2-40B4-BE49-F238E27FC236}">
+                <a16:creationId xmlns:a16="http://schemas.microsoft.com/office/drawing/2014/main" id="{D44A64B5-B5C2-885F-3224-0CF745A93160}"/>
               </a:ext>
             </a:extLst>
           </p:cNvPr>
@@ -16905,7 +17418,7 @@
         </p:nvSpPr>
         <p:spPr>
           <a:xfrm>
-            <a:off x="10661343" y="1598093"/>
+            <a:off x="8136583" y="4772144"/>
             <a:ext cx="1193762" cy="369332"/>
           </a:xfrm>
           <a:prstGeom prst="rect">
@@ -16924,62 +17437,17 @@
                 <a:latin typeface="Arial" panose="020B0604020202020204" pitchFamily="34" charset="0"/>
                 <a:cs typeface="Arial" panose="020B0604020202020204" pitchFamily="34" charset="0"/>
               </a:rPr>
-              <a:t>42.5 µm</a:t>
-            </a:r>
-          </a:p>
-        </p:txBody>
-      </p:sp>
-      <p:cxnSp>
-        <p:nvCxnSpPr>
-          <p:cNvPr id="35" name="Straight Arrow Connector 34">
-            <a:extLst>
-              <a:ext uri="{FF2B5EF4-FFF2-40B4-BE49-F238E27FC236}">
-                <a16:creationId xmlns:a16="http://schemas.microsoft.com/office/drawing/2014/main" id="{8B20B7B4-169E-1196-2E8D-405F04FED9B3}"/>
-              </a:ext>
-            </a:extLst>
-          </p:cNvPr>
-          <p:cNvCxnSpPr>
-            <a:cxnSpLocks/>
-          </p:cNvCxnSpPr>
-          <p:nvPr/>
-        </p:nvCxnSpPr>
-        <p:spPr>
-          <a:xfrm>
-            <a:off x="8082736" y="3429000"/>
-            <a:ext cx="0" cy="3055620"/>
-          </a:xfrm>
-          <a:prstGeom prst="straightConnector1">
-            <a:avLst/>
-          </a:prstGeom>
-          <a:ln>
-            <a:solidFill>
-              <a:schemeClr val="tx1"/>
-            </a:solidFill>
-            <a:headEnd type="triangle"/>
-            <a:tailEnd type="triangle"/>
-          </a:ln>
-        </p:spPr>
-        <p:style>
-          <a:lnRef idx="1">
-            <a:schemeClr val="accent1"/>
-          </a:lnRef>
-          <a:fillRef idx="0">
-            <a:schemeClr val="accent1"/>
-          </a:fillRef>
-          <a:effectRef idx="0">
-            <a:schemeClr val="accent1"/>
-          </a:effectRef>
-          <a:fontRef idx="minor">
-            <a:schemeClr val="tx1"/>
-          </a:fontRef>
-        </p:style>
-      </p:cxnSp>
-      <p:sp>
-        <p:nvSpPr>
-          <p:cNvPr id="37" name="TextBox 36">
-            <a:extLst>
-              <a:ext uri="{FF2B5EF4-FFF2-40B4-BE49-F238E27FC236}">
-                <a16:creationId xmlns:a16="http://schemas.microsoft.com/office/drawing/2014/main" id="{D44A64B5-B5C2-885F-3224-0CF745A93160}"/>
+              <a:t>82.7 µm</a:t>
+            </a:r>
+          </a:p>
+        </p:txBody>
+      </p:sp>
+      <p:sp>
+        <p:nvSpPr>
+          <p:cNvPr id="6" name="TextBox 5">
+            <a:extLst>
+              <a:ext uri="{FF2B5EF4-FFF2-40B4-BE49-F238E27FC236}">
+                <a16:creationId xmlns:a16="http://schemas.microsoft.com/office/drawing/2014/main" id="{8765A28E-2E6F-B983-F531-7381126B8629}"/>
               </a:ext>
             </a:extLst>
           </p:cNvPr>
@@ -16988,8 +17456,8 @@
         </p:nvSpPr>
         <p:spPr>
           <a:xfrm>
-            <a:off x="8136583" y="4772144"/>
-            <a:ext cx="1193762" cy="369332"/>
+            <a:off x="10119136" y="2715268"/>
+            <a:ext cx="1463370" cy="369332"/>
           </a:xfrm>
           <a:prstGeom prst="rect">
             <a:avLst/>
@@ -17002,12 +17470,382 @@
           </a:bodyPr>
           <a:lstStyle/>
           <a:p>
+            <a:pPr algn="ctr"/>
             <a:r>
               <a:rPr lang="en-US" dirty="0">
                 <a:latin typeface="Arial" panose="020B0604020202020204" pitchFamily="34" charset="0"/>
                 <a:cs typeface="Arial" panose="020B0604020202020204" pitchFamily="34" charset="0"/>
               </a:rPr>
-              <a:t>85 µm</a:t>
+              <a:t>a = 40.2 µm</a:t>
+            </a:r>
+          </a:p>
+        </p:txBody>
+      </p:sp>
+      <p:cxnSp>
+        <p:nvCxnSpPr>
+          <p:cNvPr id="9" name="Straight Arrow Connector 8">
+            <a:extLst>
+              <a:ext uri="{FF2B5EF4-FFF2-40B4-BE49-F238E27FC236}">
+                <a16:creationId xmlns:a16="http://schemas.microsoft.com/office/drawing/2014/main" id="{916818C3-77F8-2D4C-9F00-60C3C650705A}"/>
+              </a:ext>
+            </a:extLst>
+          </p:cNvPr>
+          <p:cNvCxnSpPr>
+            <a:cxnSpLocks/>
+          </p:cNvCxnSpPr>
+          <p:nvPr/>
+        </p:nvCxnSpPr>
+        <p:spPr>
+          <a:xfrm>
+            <a:off x="11000530" y="1362524"/>
+            <a:ext cx="0" cy="1183257"/>
+          </a:xfrm>
+          <a:prstGeom prst="straightConnector1">
+            <a:avLst/>
+          </a:prstGeom>
+          <a:ln>
+            <a:solidFill>
+              <a:schemeClr val="tx1"/>
+            </a:solidFill>
+            <a:headEnd type="triangle"/>
+            <a:tailEnd type="triangle"/>
+          </a:ln>
+        </p:spPr>
+        <p:style>
+          <a:lnRef idx="1">
+            <a:schemeClr val="accent1"/>
+          </a:lnRef>
+          <a:fillRef idx="0">
+            <a:schemeClr val="accent1"/>
+          </a:fillRef>
+          <a:effectRef idx="0">
+            <a:schemeClr val="accent1"/>
+          </a:effectRef>
+          <a:fontRef idx="minor">
+            <a:schemeClr val="tx1"/>
+          </a:fontRef>
+        </p:style>
+      </p:cxnSp>
+      <p:cxnSp>
+        <p:nvCxnSpPr>
+          <p:cNvPr id="17" name="Straight Arrow Connector 16">
+            <a:extLst>
+              <a:ext uri="{FF2B5EF4-FFF2-40B4-BE49-F238E27FC236}">
+                <a16:creationId xmlns:a16="http://schemas.microsoft.com/office/drawing/2014/main" id="{7D6DCA2C-2061-F12F-C834-20DB2BC6A553}"/>
+              </a:ext>
+            </a:extLst>
+          </p:cNvPr>
+          <p:cNvCxnSpPr>
+            <a:cxnSpLocks/>
+          </p:cNvCxnSpPr>
+          <p:nvPr/>
+        </p:nvCxnSpPr>
+        <p:spPr>
+          <a:xfrm>
+            <a:off x="11323364" y="1019738"/>
+            <a:ext cx="0" cy="1526042"/>
+          </a:xfrm>
+          <a:prstGeom prst="straightConnector1">
+            <a:avLst/>
+          </a:prstGeom>
+          <a:ln>
+            <a:solidFill>
+              <a:schemeClr val="tx1"/>
+            </a:solidFill>
+            <a:headEnd type="triangle"/>
+            <a:tailEnd type="triangle"/>
+          </a:ln>
+        </p:spPr>
+        <p:style>
+          <a:lnRef idx="1">
+            <a:schemeClr val="accent1"/>
+          </a:lnRef>
+          <a:fillRef idx="0">
+            <a:schemeClr val="accent1"/>
+          </a:fillRef>
+          <a:effectRef idx="0">
+            <a:schemeClr val="accent1"/>
+          </a:effectRef>
+          <a:fontRef idx="minor">
+            <a:schemeClr val="tx1"/>
+          </a:fontRef>
+        </p:style>
+      </p:cxnSp>
+      <p:sp>
+        <p:nvSpPr>
+          <p:cNvPr id="19" name="TextBox 18">
+            <a:extLst>
+              <a:ext uri="{FF2B5EF4-FFF2-40B4-BE49-F238E27FC236}">
+                <a16:creationId xmlns:a16="http://schemas.microsoft.com/office/drawing/2014/main" id="{B3E907DF-AA3A-F42E-3263-52D412CD60D9}"/>
+              </a:ext>
+            </a:extLst>
+          </p:cNvPr>
+          <p:cNvSpPr txBox="1"/>
+          <p:nvPr/>
+        </p:nvSpPr>
+        <p:spPr>
+          <a:xfrm>
+            <a:off x="10119136" y="3108078"/>
+            <a:ext cx="1463370" cy="369332"/>
+          </a:xfrm>
+          <a:prstGeom prst="rect">
+            <a:avLst/>
+          </a:prstGeom>
+          <a:noFill/>
+        </p:spPr>
+        <p:txBody>
+          <a:bodyPr wrap="square" rtlCol="0">
+            <a:spAutoFit/>
+          </a:bodyPr>
+          <a:lstStyle/>
+          <a:p>
+            <a:pPr algn="ctr"/>
+            <a:r>
+              <a:rPr lang="en-US" dirty="0">
+                <a:latin typeface="Arial" panose="020B0604020202020204" pitchFamily="34" charset="0"/>
+                <a:cs typeface="Arial" panose="020B0604020202020204" pitchFamily="34" charset="0"/>
+              </a:rPr>
+              <a:t>b = 40.7 µm</a:t>
+            </a:r>
+          </a:p>
+        </p:txBody>
+      </p:sp>
+      <p:sp>
+        <p:nvSpPr>
+          <p:cNvPr id="27" name="TextBox 26">
+            <a:extLst>
+              <a:ext uri="{FF2B5EF4-FFF2-40B4-BE49-F238E27FC236}">
+                <a16:creationId xmlns:a16="http://schemas.microsoft.com/office/drawing/2014/main" id="{E07B64D3-2E2A-2A91-BF2C-52F56A98779A}"/>
+              </a:ext>
+            </a:extLst>
+          </p:cNvPr>
+          <p:cNvSpPr txBox="1"/>
+          <p:nvPr/>
+        </p:nvSpPr>
+        <p:spPr>
+          <a:xfrm>
+            <a:off x="10119136" y="3494439"/>
+            <a:ext cx="1589554" cy="369332"/>
+          </a:xfrm>
+          <a:prstGeom prst="rect">
+            <a:avLst/>
+          </a:prstGeom>
+          <a:noFill/>
+        </p:spPr>
+        <p:txBody>
+          <a:bodyPr wrap="square" rtlCol="0">
+            <a:spAutoFit/>
+          </a:bodyPr>
+          <a:lstStyle/>
+          <a:p>
+            <a:pPr algn="ctr"/>
+            <a:r>
+              <a:rPr lang="en-US" dirty="0">
+                <a:latin typeface="Arial" panose="020B0604020202020204" pitchFamily="34" charset="0"/>
+                <a:cs typeface="Arial" panose="020B0604020202020204" pitchFamily="34" charset="0"/>
+              </a:rPr>
+              <a:t>c = 41.35 µm</a:t>
+            </a:r>
+          </a:p>
+        </p:txBody>
+      </p:sp>
+      <p:sp>
+        <p:nvSpPr>
+          <p:cNvPr id="29" name="TextBox 28">
+            <a:extLst>
+              <a:ext uri="{FF2B5EF4-FFF2-40B4-BE49-F238E27FC236}">
+                <a16:creationId xmlns:a16="http://schemas.microsoft.com/office/drawing/2014/main" id="{E4EFE653-C426-91F3-7A69-CB8CC4B1B412}"/>
+              </a:ext>
+            </a:extLst>
+          </p:cNvPr>
+          <p:cNvSpPr txBox="1"/>
+          <p:nvPr/>
+        </p:nvSpPr>
+        <p:spPr>
+          <a:xfrm>
+            <a:off x="10403517" y="1968397"/>
+            <a:ext cx="405151" cy="338554"/>
+          </a:xfrm>
+          <a:prstGeom prst="rect">
+            <a:avLst/>
+          </a:prstGeom>
+          <a:noFill/>
+        </p:spPr>
+        <p:txBody>
+          <a:bodyPr wrap="square" rtlCol="0">
+            <a:spAutoFit/>
+          </a:bodyPr>
+          <a:lstStyle/>
+          <a:p>
+            <a:pPr algn="ctr"/>
+            <a:r>
+              <a:rPr lang="en-US" sz="1600" dirty="0">
+                <a:latin typeface="Arial" panose="020B0604020202020204" pitchFamily="34" charset="0"/>
+                <a:cs typeface="Arial" panose="020B0604020202020204" pitchFamily="34" charset="0"/>
+              </a:rPr>
+              <a:t>a</a:t>
+            </a:r>
+          </a:p>
+        </p:txBody>
+      </p:sp>
+      <p:sp>
+        <p:nvSpPr>
+          <p:cNvPr id="32" name="TextBox 31">
+            <a:extLst>
+              <a:ext uri="{FF2B5EF4-FFF2-40B4-BE49-F238E27FC236}">
+                <a16:creationId xmlns:a16="http://schemas.microsoft.com/office/drawing/2014/main" id="{5D04A76A-629D-FA97-407F-7410B76ADC44}"/>
+              </a:ext>
+            </a:extLst>
+          </p:cNvPr>
+          <p:cNvSpPr txBox="1"/>
+          <p:nvPr/>
+        </p:nvSpPr>
+        <p:spPr>
+          <a:xfrm>
+            <a:off x="10725728" y="1968397"/>
+            <a:ext cx="405151" cy="338554"/>
+          </a:xfrm>
+          <a:prstGeom prst="rect">
+            <a:avLst/>
+          </a:prstGeom>
+          <a:noFill/>
+        </p:spPr>
+        <p:txBody>
+          <a:bodyPr wrap="square" rtlCol="0">
+            <a:spAutoFit/>
+          </a:bodyPr>
+          <a:lstStyle/>
+          <a:p>
+            <a:pPr algn="ctr"/>
+            <a:r>
+              <a:rPr lang="en-US" sz="1600" dirty="0">
+                <a:latin typeface="Arial" panose="020B0604020202020204" pitchFamily="34" charset="0"/>
+                <a:cs typeface="Arial" panose="020B0604020202020204" pitchFamily="34" charset="0"/>
+              </a:rPr>
+              <a:t>b</a:t>
+            </a:r>
+          </a:p>
+        </p:txBody>
+      </p:sp>
+      <p:sp>
+        <p:nvSpPr>
+          <p:cNvPr id="36" name="TextBox 35">
+            <a:extLst>
+              <a:ext uri="{FF2B5EF4-FFF2-40B4-BE49-F238E27FC236}">
+                <a16:creationId xmlns:a16="http://schemas.microsoft.com/office/drawing/2014/main" id="{53DD951D-5BF9-5508-62C0-23B437EC1F3C}"/>
+              </a:ext>
+            </a:extLst>
+          </p:cNvPr>
+          <p:cNvSpPr txBox="1"/>
+          <p:nvPr/>
+        </p:nvSpPr>
+        <p:spPr>
+          <a:xfrm>
+            <a:off x="11032062" y="1968397"/>
+            <a:ext cx="405151" cy="338554"/>
+          </a:xfrm>
+          <a:prstGeom prst="rect">
+            <a:avLst/>
+          </a:prstGeom>
+          <a:noFill/>
+        </p:spPr>
+        <p:txBody>
+          <a:bodyPr wrap="square" rtlCol="0">
+            <a:spAutoFit/>
+          </a:bodyPr>
+          <a:lstStyle/>
+          <a:p>
+            <a:pPr algn="ctr"/>
+            <a:r>
+              <a:rPr lang="en-US" sz="1600" dirty="0">
+                <a:latin typeface="Arial" panose="020B0604020202020204" pitchFamily="34" charset="0"/>
+                <a:cs typeface="Arial" panose="020B0604020202020204" pitchFamily="34" charset="0"/>
+              </a:rPr>
+              <a:t>c</a:t>
+            </a:r>
+          </a:p>
+        </p:txBody>
+      </p:sp>
+      <p:cxnSp>
+        <p:nvCxnSpPr>
+          <p:cNvPr id="38" name="Straight Arrow Connector 37">
+            <a:extLst>
+              <a:ext uri="{FF2B5EF4-FFF2-40B4-BE49-F238E27FC236}">
+                <a16:creationId xmlns:a16="http://schemas.microsoft.com/office/drawing/2014/main" id="{2E6670C1-A616-B8EB-449D-42DE2766039E}"/>
+              </a:ext>
+            </a:extLst>
+          </p:cNvPr>
+          <p:cNvCxnSpPr>
+            <a:cxnSpLocks/>
+          </p:cNvCxnSpPr>
+          <p:nvPr/>
+        </p:nvCxnSpPr>
+        <p:spPr>
+          <a:xfrm>
+            <a:off x="2774644" y="4052550"/>
+            <a:ext cx="0" cy="1812054"/>
+          </a:xfrm>
+          <a:prstGeom prst="straightConnector1">
+            <a:avLst/>
+          </a:prstGeom>
+          <a:ln>
+            <a:solidFill>
+              <a:schemeClr val="tx1"/>
+            </a:solidFill>
+            <a:headEnd type="triangle"/>
+            <a:tailEnd type="triangle"/>
+          </a:ln>
+        </p:spPr>
+        <p:style>
+          <a:lnRef idx="1">
+            <a:schemeClr val="accent1"/>
+          </a:lnRef>
+          <a:fillRef idx="0">
+            <a:schemeClr val="accent1"/>
+          </a:fillRef>
+          <a:effectRef idx="0">
+            <a:schemeClr val="accent1"/>
+          </a:effectRef>
+          <a:fontRef idx="minor">
+            <a:schemeClr val="tx1"/>
+          </a:fontRef>
+        </p:style>
+      </p:cxnSp>
+      <p:sp>
+        <p:nvSpPr>
+          <p:cNvPr id="40" name="TextBox 39">
+            <a:extLst>
+              <a:ext uri="{FF2B5EF4-FFF2-40B4-BE49-F238E27FC236}">
+                <a16:creationId xmlns:a16="http://schemas.microsoft.com/office/drawing/2014/main" id="{4C8442C6-038E-2E88-D77E-9C4C3E8AE244}"/>
+              </a:ext>
+            </a:extLst>
+          </p:cNvPr>
+          <p:cNvSpPr txBox="1"/>
+          <p:nvPr/>
+        </p:nvSpPr>
+        <p:spPr>
+          <a:xfrm>
+            <a:off x="1567236" y="4787184"/>
+            <a:ext cx="1193762" cy="369332"/>
+          </a:xfrm>
+          <a:prstGeom prst="rect">
+            <a:avLst/>
+          </a:prstGeom>
+          <a:noFill/>
+        </p:spPr>
+        <p:txBody>
+          <a:bodyPr wrap="square" rtlCol="0">
+            <a:spAutoFit/>
+          </a:bodyPr>
+          <a:lstStyle/>
+          <a:p>
+            <a:pPr algn="r"/>
+            <a:r>
+              <a:rPr lang="en-US" dirty="0">
+                <a:latin typeface="Arial" panose="020B0604020202020204" pitchFamily="34" charset="0"/>
+                <a:cs typeface="Arial" panose="020B0604020202020204" pitchFamily="34" charset="0"/>
+              </a:rPr>
+              <a:t>2.7 µm</a:t>
             </a:r>
           </a:p>
         </p:txBody>
@@ -26464,7 +27302,7 @@
         </p:nvSpPr>
         <p:spPr>
           <a:xfrm>
-            <a:off x="2799887" y="407421"/>
+            <a:off x="2772455" y="288549"/>
             <a:ext cx="6996964" cy="6043158"/>
           </a:xfrm>
           <a:prstGeom prst="rect">
@@ -26521,7 +27359,7 @@
         </p:nvSpPr>
         <p:spPr>
           <a:xfrm>
-            <a:off x="3246261" y="890044"/>
+            <a:off x="3218829" y="771172"/>
             <a:ext cx="2865026" cy="2538956"/>
           </a:xfrm>
           <a:prstGeom prst="rect">
@@ -26587,7 +27425,7 @@
         </p:nvSpPr>
         <p:spPr>
           <a:xfrm>
-            <a:off x="6557661" y="890044"/>
+            <a:off x="6530229" y="771172"/>
             <a:ext cx="2646076" cy="2352267"/>
           </a:xfrm>
           <a:prstGeom prst="rect">
@@ -26653,7 +27491,7 @@
         </p:nvSpPr>
         <p:spPr>
           <a:xfrm>
-            <a:off x="3246261" y="3987573"/>
+            <a:off x="3218829" y="3868701"/>
             <a:ext cx="2082042" cy="1537282"/>
           </a:xfrm>
           <a:prstGeom prst="rect">
@@ -27328,6 +28166,3727 @@
     <p:extLst>
       <p:ext uri="{BB962C8B-B14F-4D97-AF65-F5344CB8AC3E}">
         <p14:creationId xmlns:p14="http://schemas.microsoft.com/office/powerpoint/2010/main" val="133829040"/>
+      </p:ext>
+    </p:extLst>
+  </p:cSld>
+  <p:clrMapOvr>
+    <a:masterClrMapping/>
+  </p:clrMapOvr>
+</p:sld>
+</file>
+
+<file path=ppt/slides/slide31.xml><?xml version="1.0" encoding="utf-8"?>
+<p:sld xmlns:a="http://schemas.openxmlformats.org/drawingml/2006/main" xmlns:r="http://schemas.openxmlformats.org/officeDocument/2006/relationships" xmlns:p="http://schemas.openxmlformats.org/presentationml/2006/main">
+  <p:cSld>
+    <p:spTree>
+      <p:nvGrpSpPr>
+        <p:cNvPr id="1" name=""/>
+        <p:cNvGrpSpPr/>
+        <p:nvPr/>
+      </p:nvGrpSpPr>
+      <p:grpSpPr>
+        <a:xfrm>
+          <a:off x="0" y="0"/>
+          <a:ext cx="0" cy="0"/>
+          <a:chOff x="0" y="0"/>
+          <a:chExt cx="0" cy="0"/>
+        </a:xfrm>
+      </p:grpSpPr>
+      <p:sp>
+        <p:nvSpPr>
+          <p:cNvPr id="4" name="Title 3">
+            <a:extLst>
+              <a:ext uri="{FF2B5EF4-FFF2-40B4-BE49-F238E27FC236}">
+                <a16:creationId xmlns:a16="http://schemas.microsoft.com/office/drawing/2014/main" id="{921AFFA5-9967-F678-FBD6-396A70948A01}"/>
+              </a:ext>
+            </a:extLst>
+          </p:cNvPr>
+          <p:cNvSpPr>
+            <a:spLocks noGrp="1"/>
+          </p:cNvSpPr>
+          <p:nvPr>
+            <p:ph type="title"/>
+          </p:nvPr>
+        </p:nvSpPr>
+        <p:spPr/>
+        <p:txBody>
+          <a:bodyPr/>
+          <a:lstStyle/>
+          <a:p>
+            <a:r>
+              <a:rPr lang="en-US" dirty="0"/>
+              <a:t>Capacitors in the </a:t>
+            </a:r>
+            <a:r>
+              <a:rPr lang="en-US" dirty="0" err="1"/>
+              <a:t>Aureo</a:t>
+            </a:r>
+            <a:r>
+              <a:rPr lang="en-US" dirty="0"/>
+              <a:t> process</a:t>
+            </a:r>
+          </a:p>
+        </p:txBody>
+      </p:sp>
+      <p:sp>
+        <p:nvSpPr>
+          <p:cNvPr id="5" name="Text Placeholder 4">
+            <a:extLst>
+              <a:ext uri="{FF2B5EF4-FFF2-40B4-BE49-F238E27FC236}">
+                <a16:creationId xmlns:a16="http://schemas.microsoft.com/office/drawing/2014/main" id="{B879644A-15E4-A3C8-B3F0-DDBF903A912B}"/>
+              </a:ext>
+            </a:extLst>
+          </p:cNvPr>
+          <p:cNvSpPr>
+            <a:spLocks noGrp="1"/>
+          </p:cNvSpPr>
+          <p:nvPr>
+            <p:ph type="body" idx="1"/>
+          </p:nvPr>
+        </p:nvSpPr>
+        <p:spPr/>
+        <p:txBody>
+          <a:bodyPr/>
+          <a:lstStyle/>
+          <a:p>
+            <a:endParaRPr lang="en-US"/>
+          </a:p>
+        </p:txBody>
+      </p:sp>
+    </p:spTree>
+    <p:extLst>
+      <p:ext uri="{BB962C8B-B14F-4D97-AF65-F5344CB8AC3E}">
+        <p14:creationId xmlns:p14="http://schemas.microsoft.com/office/powerpoint/2010/main" val="1984586873"/>
+      </p:ext>
+    </p:extLst>
+  </p:cSld>
+  <p:clrMapOvr>
+    <a:masterClrMapping/>
+  </p:clrMapOvr>
+</p:sld>
+</file>
+
+<file path=ppt/slides/slide32.xml><?xml version="1.0" encoding="utf-8"?>
+<p:sld xmlns:a="http://schemas.openxmlformats.org/drawingml/2006/main" xmlns:r="http://schemas.openxmlformats.org/officeDocument/2006/relationships" xmlns:p="http://schemas.openxmlformats.org/presentationml/2006/main">
+  <p:cSld>
+    <p:spTree>
+      <p:nvGrpSpPr>
+        <p:cNvPr id="1" name=""/>
+        <p:cNvGrpSpPr/>
+        <p:nvPr/>
+      </p:nvGrpSpPr>
+      <p:grpSpPr>
+        <a:xfrm>
+          <a:off x="0" y="0"/>
+          <a:ext cx="0" cy="0"/>
+          <a:chOff x="0" y="0"/>
+          <a:chExt cx="0" cy="0"/>
+        </a:xfrm>
+      </p:grpSpPr>
+      <p:sp>
+        <p:nvSpPr>
+          <p:cNvPr id="2" name="Title 1">
+            <a:extLst>
+              <a:ext uri="{FF2B5EF4-FFF2-40B4-BE49-F238E27FC236}">
+                <a16:creationId xmlns:a16="http://schemas.microsoft.com/office/drawing/2014/main" id="{F8E6D2BE-1CCE-40DC-1290-2764592A0195}"/>
+              </a:ext>
+            </a:extLst>
+          </p:cNvPr>
+          <p:cNvSpPr>
+            <a:spLocks noGrp="1"/>
+          </p:cNvSpPr>
+          <p:nvPr>
+            <p:ph type="title"/>
+          </p:nvPr>
+        </p:nvSpPr>
+        <p:spPr>
+          <a:xfrm>
+            <a:off x="838200" y="365125"/>
+            <a:ext cx="10515600" cy="668147"/>
+          </a:xfrm>
+        </p:spPr>
+        <p:txBody>
+          <a:bodyPr>
+            <a:normAutofit/>
+          </a:bodyPr>
+          <a:lstStyle/>
+          <a:p>
+            <a:r>
+              <a:rPr lang="en-US" sz="4000" dirty="0"/>
+              <a:t>Vertical Metal-Air-Metal Capacitor (VMAM Cap)</a:t>
+            </a:r>
+          </a:p>
+        </p:txBody>
+      </p:sp>
+      <p:pic>
+        <p:nvPicPr>
+          <p:cNvPr id="5" name="Content Placeholder 54" descr="A black lines on a white background&#10;&#10;Description automatically generated">
+            <a:extLst>
+              <a:ext uri="{FF2B5EF4-FFF2-40B4-BE49-F238E27FC236}">
+                <a16:creationId xmlns:a16="http://schemas.microsoft.com/office/drawing/2014/main" id="{9921F937-C1F3-F22D-014A-CD12709D63BA}"/>
+              </a:ext>
+            </a:extLst>
+          </p:cNvPr>
+          <p:cNvPicPr>
+            <a:picLocks noChangeAspect="1"/>
+          </p:cNvPicPr>
+          <p:nvPr/>
+        </p:nvPicPr>
+        <p:blipFill>
+          <a:blip r:embed="rId2">
+            <a:extLst>
+              <a:ext uri="{BEBA8EAE-BF5A-486C-A8C5-ECC9F3942E4B}">
+                <a14:imgProps xmlns:a14="http://schemas.microsoft.com/office/drawing/2010/main">
+                  <a14:imgLayer r:embed="rId3">
+                    <a14:imgEffect>
+                      <a14:backgroundRemoval t="3509" b="89474" l="3056" r="96389">
+                        <a14:foregroundMark x1="44722" y1="5848" x2="44722" y2="5848"/>
+                        <a14:foregroundMark x1="58333" y1="47953" x2="58333" y2="47953"/>
+                        <a14:foregroundMark x1="96389" y1="49123" x2="96111" y2="49123"/>
+                        <a14:foregroundMark x1="8333" y1="47953" x2="8056" y2="47953"/>
+                        <a14:foregroundMark x1="3333" y1="47953" x2="3333" y2="47953"/>
+                        <a14:foregroundMark x1="57500" y1="3509" x2="57500" y2="3509"/>
+                      </a14:backgroundRemoval>
+                    </a14:imgEffect>
+                  </a14:imgLayer>
+                </a14:imgProps>
+              </a:ext>
+              <a:ext uri="{28A0092B-C50C-407E-A947-70E740481C1C}">
+                <a14:useLocalDpi xmlns:a14="http://schemas.microsoft.com/office/drawing/2010/main" val="0"/>
+              </a:ext>
+            </a:extLst>
+          </a:blip>
+          <a:stretch>
+            <a:fillRect/>
+          </a:stretch>
+        </p:blipFill>
+        <p:spPr>
+          <a:xfrm rot="16200000">
+            <a:off x="5591765" y="3964805"/>
+            <a:ext cx="740009" cy="351504"/>
+          </a:xfrm>
+          <a:prstGeom prst="rect">
+            <a:avLst/>
+          </a:prstGeom>
+          <a:noFill/>
+        </p:spPr>
+      </p:pic>
+      <p:sp>
+        <p:nvSpPr>
+          <p:cNvPr id="7" name="TextBox 6">
+            <a:extLst>
+              <a:ext uri="{FF2B5EF4-FFF2-40B4-BE49-F238E27FC236}">
+                <a16:creationId xmlns:a16="http://schemas.microsoft.com/office/drawing/2014/main" id="{C6C9D833-3737-A26B-8F04-5E01191A480D}"/>
+              </a:ext>
+            </a:extLst>
+          </p:cNvPr>
+          <p:cNvSpPr txBox="1"/>
+          <p:nvPr/>
+        </p:nvSpPr>
+        <p:spPr>
+          <a:xfrm>
+            <a:off x="4908507" y="4405708"/>
+            <a:ext cx="2286000" cy="338554"/>
+          </a:xfrm>
+          <a:prstGeom prst="rect">
+            <a:avLst/>
+          </a:prstGeom>
+          <a:noFill/>
+        </p:spPr>
+        <p:txBody>
+          <a:bodyPr wrap="square" rtlCol="0">
+            <a:spAutoFit/>
+          </a:bodyPr>
+          <a:lstStyle/>
+          <a:p>
+            <a:pPr algn="ctr"/>
+            <a:r>
+              <a:rPr lang="en-US" sz="1600" b="1" dirty="0">
+                <a:solidFill>
+                  <a:schemeClr val="bg1"/>
+                </a:solidFill>
+              </a:rPr>
+              <a:t>Digital</a:t>
+            </a:r>
+          </a:p>
+        </p:txBody>
+      </p:sp>
+      <p:sp>
+        <p:nvSpPr>
+          <p:cNvPr id="8" name="Rectangle 7">
+            <a:extLst>
+              <a:ext uri="{FF2B5EF4-FFF2-40B4-BE49-F238E27FC236}">
+                <a16:creationId xmlns:a16="http://schemas.microsoft.com/office/drawing/2014/main" id="{A41F76EE-5E19-750D-767D-5BB1E399C788}"/>
+              </a:ext>
+            </a:extLst>
+          </p:cNvPr>
+          <p:cNvSpPr/>
+          <p:nvPr/>
+        </p:nvSpPr>
+        <p:spPr>
+          <a:xfrm rot="10800000" flipV="1">
+            <a:off x="4441312" y="2061924"/>
+            <a:ext cx="3040914" cy="873300"/>
+          </a:xfrm>
+          <a:prstGeom prst="rect">
+            <a:avLst/>
+          </a:prstGeom>
+          <a:solidFill>
+            <a:srgbClr val="A5A5A5">
+              <a:lumMod val="40000"/>
+              <a:lumOff val="60000"/>
+            </a:srgbClr>
+          </a:solidFill>
+          <a:ln w="6350" cap="flat" cmpd="sng" algn="ctr">
+            <a:solidFill>
+              <a:sysClr val="windowText" lastClr="000000"/>
+            </a:solidFill>
+            <a:prstDash val="solid"/>
+            <a:miter lim="800000"/>
+          </a:ln>
+          <a:effectLst/>
+        </p:spPr>
+        <p:txBody>
+          <a:bodyPr rtlCol="0" anchor="ctr"/>
+          <a:lstStyle/>
+          <a:p>
+            <a:pPr marL="0" marR="0" lvl="0" indent="0" algn="ctr" defTabSz="914400" eaLnBrk="1" fontAlgn="auto" latinLnBrk="0" hangingPunct="1">
+              <a:lnSpc>
+                <a:spcPct val="100000"/>
+              </a:lnSpc>
+              <a:spcBef>
+                <a:spcPts val="0"/>
+              </a:spcBef>
+              <a:spcAft>
+                <a:spcPts val="0"/>
+              </a:spcAft>
+              <a:buClrTx/>
+              <a:buSzTx/>
+              <a:buFontTx/>
+              <a:buNone/>
+              <a:tabLst/>
+              <a:defRPr/>
+            </a:pPr>
+            <a:r>
+              <a:rPr kumimoji="0" lang="en-US" sz="1600" b="0" i="0" u="none" strike="noStrike" kern="0" cap="none" spc="0" normalizeH="0" baseline="0" noProof="0" dirty="0">
+                <a:ln>
+                  <a:noFill/>
+                </a:ln>
+                <a:solidFill>
+                  <a:prstClr val="black"/>
+                </a:solidFill>
+                <a:effectLst/>
+                <a:uLnTx/>
+                <a:uFillTx/>
+                <a:latin typeface="Arial" panose="020B0604020202020204" pitchFamily="34" charset="0"/>
+                <a:ea typeface="+mn-ea"/>
+                <a:cs typeface="Arial" panose="020B0604020202020204" pitchFamily="34" charset="0"/>
+              </a:rPr>
+              <a:t>SOI2</a:t>
+            </a:r>
+          </a:p>
+        </p:txBody>
+      </p:sp>
+      <p:sp>
+        <p:nvSpPr>
+          <p:cNvPr id="9" name="Rectangle 8">
+            <a:extLst>
+              <a:ext uri="{FF2B5EF4-FFF2-40B4-BE49-F238E27FC236}">
+                <a16:creationId xmlns:a16="http://schemas.microsoft.com/office/drawing/2014/main" id="{DF77750D-88F5-D54C-BC59-A870D5EC2E92}"/>
+              </a:ext>
+            </a:extLst>
+          </p:cNvPr>
+          <p:cNvSpPr/>
+          <p:nvPr/>
+        </p:nvSpPr>
+        <p:spPr>
+          <a:xfrm>
+            <a:off x="4872650" y="4404461"/>
+            <a:ext cx="2136707" cy="342786"/>
+          </a:xfrm>
+          <a:prstGeom prst="rect">
+            <a:avLst/>
+          </a:prstGeom>
+          <a:solidFill>
+            <a:srgbClr val="FFC000">
+              <a:lumMod val="40000"/>
+              <a:lumOff val="60000"/>
+            </a:srgbClr>
+          </a:solidFill>
+          <a:ln w="6350" cap="flat" cmpd="sng" algn="ctr">
+            <a:solidFill>
+              <a:sysClr val="windowText" lastClr="000000"/>
+            </a:solidFill>
+            <a:prstDash val="solid"/>
+            <a:miter lim="800000"/>
+          </a:ln>
+          <a:effectLst/>
+        </p:spPr>
+        <p:txBody>
+          <a:bodyPr rtlCol="0" anchor="ctr"/>
+          <a:lstStyle/>
+          <a:p>
+            <a:pPr marL="0" marR="0" lvl="0" indent="0" algn="ctr" defTabSz="914400" eaLnBrk="1" fontAlgn="auto" latinLnBrk="0" hangingPunct="1">
+              <a:lnSpc>
+                <a:spcPct val="100000"/>
+              </a:lnSpc>
+              <a:spcBef>
+                <a:spcPts val="0"/>
+              </a:spcBef>
+              <a:spcAft>
+                <a:spcPts val="0"/>
+              </a:spcAft>
+              <a:buClrTx/>
+              <a:buSzTx/>
+              <a:buFontTx/>
+              <a:buNone/>
+              <a:tabLst/>
+              <a:defRPr/>
+            </a:pPr>
+            <a:r>
+              <a:rPr kumimoji="0" lang="en-US" sz="1600" b="0" i="0" u="none" strike="noStrike" kern="0" cap="none" spc="0" normalizeH="0" baseline="0" noProof="0" dirty="0">
+                <a:ln>
+                  <a:noFill/>
+                </a:ln>
+                <a:solidFill>
+                  <a:prstClr val="black"/>
+                </a:solidFill>
+                <a:effectLst/>
+                <a:uLnTx/>
+                <a:uFillTx/>
+                <a:latin typeface="Arial" panose="020B0604020202020204" pitchFamily="34" charset="0"/>
+                <a:ea typeface="+mn-ea"/>
+                <a:cs typeface="Arial" panose="020B0604020202020204" pitchFamily="34" charset="0"/>
+              </a:rPr>
+              <a:t>METAL1</a:t>
+            </a:r>
+          </a:p>
+        </p:txBody>
+      </p:sp>
+      <p:sp>
+        <p:nvSpPr>
+          <p:cNvPr id="10" name="Rectangle 9">
+            <a:extLst>
+              <a:ext uri="{FF2B5EF4-FFF2-40B4-BE49-F238E27FC236}">
+                <a16:creationId xmlns:a16="http://schemas.microsoft.com/office/drawing/2014/main" id="{AF4D6B97-8D15-4A3F-AC5A-C72A4BEDBDF7}"/>
+              </a:ext>
+            </a:extLst>
+          </p:cNvPr>
+          <p:cNvSpPr/>
+          <p:nvPr/>
+        </p:nvSpPr>
+        <p:spPr>
+          <a:xfrm>
+            <a:off x="4441314" y="4744262"/>
+            <a:ext cx="3040912" cy="873300"/>
+          </a:xfrm>
+          <a:prstGeom prst="rect">
+            <a:avLst/>
+          </a:prstGeom>
+          <a:solidFill>
+            <a:srgbClr val="A5A5A5">
+              <a:lumMod val="40000"/>
+              <a:lumOff val="60000"/>
+            </a:srgbClr>
+          </a:solidFill>
+          <a:ln w="6350" cap="flat" cmpd="sng" algn="ctr">
+            <a:solidFill>
+              <a:sysClr val="windowText" lastClr="000000"/>
+            </a:solidFill>
+            <a:prstDash val="solid"/>
+            <a:miter lim="800000"/>
+          </a:ln>
+          <a:effectLst/>
+        </p:spPr>
+        <p:txBody>
+          <a:bodyPr rtlCol="0" anchor="ctr"/>
+          <a:lstStyle/>
+          <a:p>
+            <a:pPr marL="0" marR="0" lvl="0" indent="0" algn="ctr" defTabSz="914400" eaLnBrk="1" fontAlgn="auto" latinLnBrk="0" hangingPunct="1">
+              <a:lnSpc>
+                <a:spcPct val="100000"/>
+              </a:lnSpc>
+              <a:spcBef>
+                <a:spcPts val="0"/>
+              </a:spcBef>
+              <a:spcAft>
+                <a:spcPts val="0"/>
+              </a:spcAft>
+              <a:buClrTx/>
+              <a:buSzTx/>
+              <a:buFontTx/>
+              <a:buNone/>
+              <a:tabLst/>
+              <a:defRPr/>
+            </a:pPr>
+            <a:r>
+              <a:rPr kumimoji="0" lang="en-US" sz="1600" b="0" i="0" u="none" strike="noStrike" kern="0" cap="none" spc="0" normalizeH="0" baseline="0" noProof="0" dirty="0">
+                <a:ln>
+                  <a:noFill/>
+                </a:ln>
+                <a:solidFill>
+                  <a:prstClr val="black"/>
+                </a:solidFill>
+                <a:effectLst/>
+                <a:uLnTx/>
+                <a:uFillTx/>
+                <a:latin typeface="Arial" panose="020B0604020202020204" pitchFamily="34" charset="0"/>
+                <a:ea typeface="+mn-ea"/>
+                <a:cs typeface="Arial" panose="020B0604020202020204" pitchFamily="34" charset="0"/>
+              </a:rPr>
+              <a:t>SOI1</a:t>
+            </a:r>
+          </a:p>
+        </p:txBody>
+      </p:sp>
+      <p:sp>
+        <p:nvSpPr>
+          <p:cNvPr id="11" name="Rectangle 10">
+            <a:extLst>
+              <a:ext uri="{FF2B5EF4-FFF2-40B4-BE49-F238E27FC236}">
+                <a16:creationId xmlns:a16="http://schemas.microsoft.com/office/drawing/2014/main" id="{1DD275B2-78FC-D14F-C597-34BC93F6065D}"/>
+              </a:ext>
+            </a:extLst>
+          </p:cNvPr>
+          <p:cNvSpPr/>
+          <p:nvPr/>
+        </p:nvSpPr>
+        <p:spPr>
+          <a:xfrm rot="10800000" flipV="1">
+            <a:off x="4846880" y="2935799"/>
+            <a:ext cx="2188248" cy="220455"/>
+          </a:xfrm>
+          <a:prstGeom prst="rect">
+            <a:avLst/>
+          </a:prstGeom>
+          <a:solidFill>
+            <a:srgbClr val="70AD47">
+              <a:lumMod val="40000"/>
+              <a:lumOff val="60000"/>
+            </a:srgbClr>
+          </a:solidFill>
+          <a:ln w="6350" cap="flat" cmpd="sng" algn="ctr">
+            <a:solidFill>
+              <a:sysClr val="windowText" lastClr="000000"/>
+            </a:solidFill>
+            <a:prstDash val="solid"/>
+            <a:miter lim="800000"/>
+          </a:ln>
+          <a:effectLst/>
+        </p:spPr>
+        <p:txBody>
+          <a:bodyPr rtlCol="0" anchor="ctr"/>
+          <a:lstStyle/>
+          <a:p>
+            <a:pPr marL="0" marR="0" lvl="0" indent="0" algn="ctr" defTabSz="914400" eaLnBrk="1" fontAlgn="auto" latinLnBrk="0" hangingPunct="1">
+              <a:lnSpc>
+                <a:spcPct val="100000"/>
+              </a:lnSpc>
+              <a:spcBef>
+                <a:spcPts val="0"/>
+              </a:spcBef>
+              <a:spcAft>
+                <a:spcPts val="0"/>
+              </a:spcAft>
+              <a:buClrTx/>
+              <a:buSzTx/>
+              <a:buFontTx/>
+              <a:buNone/>
+              <a:tabLst/>
+              <a:defRPr/>
+            </a:pPr>
+            <a:r>
+              <a:rPr kumimoji="0" lang="en-US" sz="1600" b="0" i="0" u="none" strike="noStrike" kern="0" cap="none" spc="0" normalizeH="0" baseline="0" noProof="0" dirty="0">
+                <a:ln>
+                  <a:noFill/>
+                </a:ln>
+                <a:solidFill>
+                  <a:prstClr val="black"/>
+                </a:solidFill>
+                <a:effectLst/>
+                <a:uLnTx/>
+                <a:uFillTx/>
+                <a:latin typeface="Arial" panose="020B0604020202020204" pitchFamily="34" charset="0"/>
+                <a:ea typeface="+mn-ea"/>
+                <a:cs typeface="Arial" panose="020B0604020202020204" pitchFamily="34" charset="0"/>
+              </a:rPr>
+              <a:t>NITRIDE</a:t>
+            </a:r>
+          </a:p>
+        </p:txBody>
+      </p:sp>
+      <p:sp>
+        <p:nvSpPr>
+          <p:cNvPr id="12" name="Rectangle 11">
+            <a:extLst>
+              <a:ext uri="{FF2B5EF4-FFF2-40B4-BE49-F238E27FC236}">
+                <a16:creationId xmlns:a16="http://schemas.microsoft.com/office/drawing/2014/main" id="{4B3E0BDF-CD54-9CA2-C7F3-84837957B837}"/>
+              </a:ext>
+            </a:extLst>
+          </p:cNvPr>
+          <p:cNvSpPr/>
+          <p:nvPr/>
+        </p:nvSpPr>
+        <p:spPr>
+          <a:xfrm rot="10800000" flipV="1">
+            <a:off x="4723716" y="3152794"/>
+            <a:ext cx="2411149" cy="338554"/>
+          </a:xfrm>
+          <a:prstGeom prst="rect">
+            <a:avLst/>
+          </a:prstGeom>
+          <a:solidFill>
+            <a:srgbClr val="ED7D31">
+              <a:lumMod val="40000"/>
+              <a:lumOff val="60000"/>
+            </a:srgbClr>
+          </a:solidFill>
+          <a:ln w="6350" cap="flat" cmpd="sng" algn="ctr">
+            <a:solidFill>
+              <a:sysClr val="windowText" lastClr="000000"/>
+            </a:solidFill>
+            <a:prstDash val="solid"/>
+            <a:miter lim="800000"/>
+          </a:ln>
+          <a:effectLst/>
+        </p:spPr>
+        <p:txBody>
+          <a:bodyPr rtlCol="0" anchor="ctr"/>
+          <a:lstStyle/>
+          <a:p>
+            <a:pPr marL="0" marR="0" lvl="0" indent="0" algn="ctr" defTabSz="914400" eaLnBrk="1" fontAlgn="auto" latinLnBrk="0" hangingPunct="1">
+              <a:lnSpc>
+                <a:spcPct val="100000"/>
+              </a:lnSpc>
+              <a:spcBef>
+                <a:spcPts val="0"/>
+              </a:spcBef>
+              <a:spcAft>
+                <a:spcPts val="0"/>
+              </a:spcAft>
+              <a:buClrTx/>
+              <a:buSzTx/>
+              <a:buFontTx/>
+              <a:buNone/>
+              <a:tabLst/>
+              <a:defRPr/>
+            </a:pPr>
+            <a:r>
+              <a:rPr kumimoji="0" lang="en-US" sz="1600" b="0" i="0" u="none" strike="noStrike" kern="0" cap="none" spc="0" normalizeH="0" baseline="0" noProof="0" dirty="0">
+                <a:ln>
+                  <a:noFill/>
+                </a:ln>
+                <a:solidFill>
+                  <a:prstClr val="black"/>
+                </a:solidFill>
+                <a:effectLst/>
+                <a:uLnTx/>
+                <a:uFillTx/>
+                <a:latin typeface="Arial" panose="020B0604020202020204" pitchFamily="34" charset="0"/>
+                <a:ea typeface="+mn-ea"/>
+                <a:cs typeface="Arial" panose="020B0604020202020204" pitchFamily="34" charset="0"/>
+              </a:rPr>
+              <a:t>POLY2</a:t>
+            </a:r>
+          </a:p>
+        </p:txBody>
+      </p:sp>
+      <p:sp>
+        <p:nvSpPr>
+          <p:cNvPr id="13" name="Rectangle 12">
+            <a:extLst>
+              <a:ext uri="{FF2B5EF4-FFF2-40B4-BE49-F238E27FC236}">
+                <a16:creationId xmlns:a16="http://schemas.microsoft.com/office/drawing/2014/main" id="{3E9C8CC2-9022-CAEC-2818-C331701EE27B}"/>
+              </a:ext>
+            </a:extLst>
+          </p:cNvPr>
+          <p:cNvSpPr/>
+          <p:nvPr/>
+        </p:nvSpPr>
+        <p:spPr>
+          <a:xfrm rot="10800000" flipV="1">
+            <a:off x="4846879" y="3491004"/>
+            <a:ext cx="2188249" cy="342786"/>
+          </a:xfrm>
+          <a:prstGeom prst="rect">
+            <a:avLst/>
+          </a:prstGeom>
+          <a:solidFill>
+            <a:srgbClr val="FFC000">
+              <a:lumMod val="40000"/>
+              <a:lumOff val="60000"/>
+            </a:srgbClr>
+          </a:solidFill>
+          <a:ln w="6350" cap="flat" cmpd="sng" algn="ctr">
+            <a:solidFill>
+              <a:sysClr val="windowText" lastClr="000000"/>
+            </a:solidFill>
+            <a:prstDash val="solid"/>
+            <a:miter lim="800000"/>
+          </a:ln>
+          <a:effectLst/>
+        </p:spPr>
+        <p:txBody>
+          <a:bodyPr rtlCol="0" anchor="ctr"/>
+          <a:lstStyle/>
+          <a:p>
+            <a:pPr marL="0" marR="0" lvl="0" indent="0" algn="ctr" defTabSz="914400" eaLnBrk="1" fontAlgn="auto" latinLnBrk="0" hangingPunct="1">
+              <a:lnSpc>
+                <a:spcPct val="100000"/>
+              </a:lnSpc>
+              <a:spcBef>
+                <a:spcPts val="0"/>
+              </a:spcBef>
+              <a:spcAft>
+                <a:spcPts val="0"/>
+              </a:spcAft>
+              <a:buClrTx/>
+              <a:buSzTx/>
+              <a:buFontTx/>
+              <a:buNone/>
+              <a:tabLst/>
+              <a:defRPr/>
+            </a:pPr>
+            <a:r>
+              <a:rPr kumimoji="0" lang="en-US" sz="1600" b="0" i="0" u="none" strike="noStrike" kern="0" cap="none" spc="0" normalizeH="0" baseline="0" noProof="0" dirty="0">
+                <a:ln>
+                  <a:noFill/>
+                </a:ln>
+                <a:solidFill>
+                  <a:prstClr val="black"/>
+                </a:solidFill>
+                <a:effectLst/>
+                <a:uLnTx/>
+                <a:uFillTx/>
+                <a:latin typeface="Arial" panose="020B0604020202020204" pitchFamily="34" charset="0"/>
+                <a:ea typeface="+mn-ea"/>
+                <a:cs typeface="Arial" panose="020B0604020202020204" pitchFamily="34" charset="0"/>
+              </a:rPr>
+              <a:t>METAL2</a:t>
+            </a:r>
+          </a:p>
+        </p:txBody>
+      </p:sp>
+      <p:cxnSp>
+        <p:nvCxnSpPr>
+          <p:cNvPr id="26" name="Straight Arrow Connector 25">
+            <a:extLst>
+              <a:ext uri="{FF2B5EF4-FFF2-40B4-BE49-F238E27FC236}">
+                <a16:creationId xmlns:a16="http://schemas.microsoft.com/office/drawing/2014/main" id="{81476D56-092A-9E1D-0C3D-4E87E7E9EE12}"/>
+              </a:ext>
+            </a:extLst>
+          </p:cNvPr>
+          <p:cNvCxnSpPr>
+            <a:cxnSpLocks/>
+          </p:cNvCxnSpPr>
+          <p:nvPr/>
+        </p:nvCxnSpPr>
+        <p:spPr>
+          <a:xfrm>
+            <a:off x="7635537" y="4434305"/>
+            <a:ext cx="0" cy="309957"/>
+          </a:xfrm>
+          <a:prstGeom prst="straightConnector1">
+            <a:avLst/>
+          </a:prstGeom>
+          <a:ln>
+            <a:solidFill>
+              <a:schemeClr val="tx1"/>
+            </a:solidFill>
+            <a:headEnd type="triangle"/>
+            <a:tailEnd type="triangle"/>
+          </a:ln>
+        </p:spPr>
+        <p:style>
+          <a:lnRef idx="1">
+            <a:schemeClr val="accent1"/>
+          </a:lnRef>
+          <a:fillRef idx="0">
+            <a:schemeClr val="accent1"/>
+          </a:fillRef>
+          <a:effectRef idx="0">
+            <a:schemeClr val="accent1"/>
+          </a:effectRef>
+          <a:fontRef idx="minor">
+            <a:schemeClr val="tx1"/>
+          </a:fontRef>
+        </p:style>
+      </p:cxnSp>
+      <p:sp>
+        <p:nvSpPr>
+          <p:cNvPr id="27" name="TextBox 26">
+            <a:extLst>
+              <a:ext uri="{FF2B5EF4-FFF2-40B4-BE49-F238E27FC236}">
+                <a16:creationId xmlns:a16="http://schemas.microsoft.com/office/drawing/2014/main" id="{60112FC9-F57F-2598-965A-D446D514431D}"/>
+              </a:ext>
+            </a:extLst>
+          </p:cNvPr>
+          <p:cNvSpPr txBox="1"/>
+          <p:nvPr/>
+        </p:nvSpPr>
+        <p:spPr>
+          <a:xfrm>
+            <a:off x="7798376" y="4390319"/>
+            <a:ext cx="905256" cy="369332"/>
+          </a:xfrm>
+          <a:prstGeom prst="rect">
+            <a:avLst/>
+          </a:prstGeom>
+          <a:noFill/>
+        </p:spPr>
+        <p:txBody>
+          <a:bodyPr wrap="square" rtlCol="0">
+            <a:spAutoFit/>
+          </a:bodyPr>
+          <a:lstStyle/>
+          <a:p>
+            <a:pPr algn="ctr"/>
+            <a:r>
+              <a:rPr lang="en-US" dirty="0">
+                <a:latin typeface="Arial" panose="020B0604020202020204" pitchFamily="34" charset="0"/>
+                <a:cs typeface="Arial" panose="020B0604020202020204" pitchFamily="34" charset="0"/>
+              </a:rPr>
+              <a:t>650nm</a:t>
+            </a:r>
+          </a:p>
+        </p:txBody>
+      </p:sp>
+      <p:cxnSp>
+        <p:nvCxnSpPr>
+          <p:cNvPr id="29" name="Straight Arrow Connector 28">
+            <a:extLst>
+              <a:ext uri="{FF2B5EF4-FFF2-40B4-BE49-F238E27FC236}">
+                <a16:creationId xmlns:a16="http://schemas.microsoft.com/office/drawing/2014/main" id="{A1892A34-B5D8-4E65-B5C4-479FB33598B2}"/>
+              </a:ext>
+            </a:extLst>
+          </p:cNvPr>
+          <p:cNvCxnSpPr>
+            <a:cxnSpLocks/>
+          </p:cNvCxnSpPr>
+          <p:nvPr/>
+        </p:nvCxnSpPr>
+        <p:spPr>
+          <a:xfrm>
+            <a:off x="7635538" y="2935224"/>
+            <a:ext cx="0" cy="898566"/>
+          </a:xfrm>
+          <a:prstGeom prst="straightConnector1">
+            <a:avLst/>
+          </a:prstGeom>
+          <a:ln>
+            <a:solidFill>
+              <a:schemeClr val="tx1"/>
+            </a:solidFill>
+            <a:headEnd type="triangle"/>
+            <a:tailEnd type="triangle"/>
+          </a:ln>
+        </p:spPr>
+        <p:style>
+          <a:lnRef idx="1">
+            <a:schemeClr val="accent1"/>
+          </a:lnRef>
+          <a:fillRef idx="0">
+            <a:schemeClr val="accent1"/>
+          </a:fillRef>
+          <a:effectRef idx="0">
+            <a:schemeClr val="accent1"/>
+          </a:effectRef>
+          <a:fontRef idx="minor">
+            <a:schemeClr val="tx1"/>
+          </a:fontRef>
+        </p:style>
+      </p:cxnSp>
+      <p:sp>
+        <p:nvSpPr>
+          <p:cNvPr id="31" name="TextBox 30">
+            <a:extLst>
+              <a:ext uri="{FF2B5EF4-FFF2-40B4-BE49-F238E27FC236}">
+                <a16:creationId xmlns:a16="http://schemas.microsoft.com/office/drawing/2014/main" id="{57159611-C912-6833-6488-19858BB02CA8}"/>
+              </a:ext>
+            </a:extLst>
+          </p:cNvPr>
+          <p:cNvSpPr txBox="1"/>
+          <p:nvPr/>
+        </p:nvSpPr>
+        <p:spPr>
+          <a:xfrm>
+            <a:off x="7735275" y="3152793"/>
+            <a:ext cx="1106181" cy="369332"/>
+          </a:xfrm>
+          <a:prstGeom prst="rect">
+            <a:avLst/>
+          </a:prstGeom>
+          <a:noFill/>
+        </p:spPr>
+        <p:txBody>
+          <a:bodyPr wrap="square" rtlCol="0">
+            <a:spAutoFit/>
+          </a:bodyPr>
+          <a:lstStyle/>
+          <a:p>
+            <a:pPr algn="ctr"/>
+            <a:r>
+              <a:rPr lang="en-US" dirty="0">
+                <a:latin typeface="Arial" panose="020B0604020202020204" pitchFamily="34" charset="0"/>
+                <a:cs typeface="Arial" panose="020B0604020202020204" pitchFamily="34" charset="0"/>
+              </a:rPr>
+              <a:t>1350nm</a:t>
+            </a:r>
+          </a:p>
+        </p:txBody>
+      </p:sp>
+      <p:cxnSp>
+        <p:nvCxnSpPr>
+          <p:cNvPr id="32" name="Straight Arrow Connector 31">
+            <a:extLst>
+              <a:ext uri="{FF2B5EF4-FFF2-40B4-BE49-F238E27FC236}">
+                <a16:creationId xmlns:a16="http://schemas.microsoft.com/office/drawing/2014/main" id="{FF42BD8E-3029-C932-A69B-F0AC793AFA46}"/>
+              </a:ext>
+            </a:extLst>
+          </p:cNvPr>
+          <p:cNvCxnSpPr>
+            <a:cxnSpLocks/>
+          </p:cNvCxnSpPr>
+          <p:nvPr/>
+        </p:nvCxnSpPr>
+        <p:spPr>
+          <a:xfrm>
+            <a:off x="4320838" y="2954274"/>
+            <a:ext cx="0" cy="1805377"/>
+          </a:xfrm>
+          <a:prstGeom prst="straightConnector1">
+            <a:avLst/>
+          </a:prstGeom>
+          <a:ln>
+            <a:solidFill>
+              <a:schemeClr val="tx1"/>
+            </a:solidFill>
+            <a:headEnd type="triangle"/>
+            <a:tailEnd type="triangle"/>
+          </a:ln>
+        </p:spPr>
+        <p:style>
+          <a:lnRef idx="1">
+            <a:schemeClr val="accent1"/>
+          </a:lnRef>
+          <a:fillRef idx="0">
+            <a:schemeClr val="accent1"/>
+          </a:fillRef>
+          <a:effectRef idx="0">
+            <a:schemeClr val="accent1"/>
+          </a:effectRef>
+          <a:fontRef idx="minor">
+            <a:schemeClr val="tx1"/>
+          </a:fontRef>
+        </p:style>
+      </p:cxnSp>
+      <p:sp>
+        <p:nvSpPr>
+          <p:cNvPr id="34" name="TextBox 33">
+            <a:extLst>
+              <a:ext uri="{FF2B5EF4-FFF2-40B4-BE49-F238E27FC236}">
+                <a16:creationId xmlns:a16="http://schemas.microsoft.com/office/drawing/2014/main" id="{D77C7BFC-4A64-EA88-E96A-2BA3B360BC70}"/>
+              </a:ext>
+            </a:extLst>
+          </p:cNvPr>
+          <p:cNvSpPr txBox="1"/>
+          <p:nvPr/>
+        </p:nvSpPr>
+        <p:spPr>
+          <a:xfrm>
+            <a:off x="3110371" y="3771225"/>
+            <a:ext cx="1106181" cy="369332"/>
+          </a:xfrm>
+          <a:prstGeom prst="rect">
+            <a:avLst/>
+          </a:prstGeom>
+          <a:noFill/>
+        </p:spPr>
+        <p:txBody>
+          <a:bodyPr wrap="square" rtlCol="0">
+            <a:spAutoFit/>
+          </a:bodyPr>
+          <a:lstStyle/>
+          <a:p>
+            <a:pPr algn="ctr"/>
+            <a:r>
+              <a:rPr lang="en-US" dirty="0">
+                <a:latin typeface="Arial" panose="020B0604020202020204" pitchFamily="34" charset="0"/>
+                <a:cs typeface="Arial" panose="020B0604020202020204" pitchFamily="34" charset="0"/>
+              </a:rPr>
+              <a:t>2700nm</a:t>
+            </a:r>
+          </a:p>
+        </p:txBody>
+      </p:sp>
+      <p:cxnSp>
+        <p:nvCxnSpPr>
+          <p:cNvPr id="35" name="Straight Arrow Connector 34">
+            <a:extLst>
+              <a:ext uri="{FF2B5EF4-FFF2-40B4-BE49-F238E27FC236}">
+                <a16:creationId xmlns:a16="http://schemas.microsoft.com/office/drawing/2014/main" id="{6A5F976E-7DC1-1DD3-53E9-D305283C88DD}"/>
+              </a:ext>
+            </a:extLst>
+          </p:cNvPr>
+          <p:cNvCxnSpPr>
+            <a:cxnSpLocks/>
+          </p:cNvCxnSpPr>
+          <p:nvPr/>
+        </p:nvCxnSpPr>
+        <p:spPr>
+          <a:xfrm>
+            <a:off x="7635538" y="3833790"/>
+            <a:ext cx="0" cy="600515"/>
+          </a:xfrm>
+          <a:prstGeom prst="straightConnector1">
+            <a:avLst/>
+          </a:prstGeom>
+          <a:ln>
+            <a:headEnd type="triangle"/>
+            <a:tailEnd type="triangle"/>
+          </a:ln>
+        </p:spPr>
+        <p:style>
+          <a:lnRef idx="1">
+            <a:schemeClr val="accent1"/>
+          </a:lnRef>
+          <a:fillRef idx="0">
+            <a:schemeClr val="accent1"/>
+          </a:fillRef>
+          <a:effectRef idx="0">
+            <a:schemeClr val="accent1"/>
+          </a:effectRef>
+          <a:fontRef idx="minor">
+            <a:schemeClr val="tx1"/>
+          </a:fontRef>
+        </p:style>
+      </p:cxnSp>
+      <p:sp>
+        <p:nvSpPr>
+          <p:cNvPr id="39" name="TextBox 38">
+            <a:extLst>
+              <a:ext uri="{FF2B5EF4-FFF2-40B4-BE49-F238E27FC236}">
+                <a16:creationId xmlns:a16="http://schemas.microsoft.com/office/drawing/2014/main" id="{C6F5E0EC-C8F8-A50D-D1F3-52A21FAB5B10}"/>
+              </a:ext>
+            </a:extLst>
+          </p:cNvPr>
+          <p:cNvSpPr txBox="1"/>
+          <p:nvPr/>
+        </p:nvSpPr>
+        <p:spPr>
+          <a:xfrm>
+            <a:off x="7792846" y="3949381"/>
+            <a:ext cx="910783" cy="369332"/>
+          </a:xfrm>
+          <a:prstGeom prst="rect">
+            <a:avLst/>
+          </a:prstGeom>
+          <a:noFill/>
+        </p:spPr>
+        <p:txBody>
+          <a:bodyPr wrap="square" rtlCol="0">
+            <a:spAutoFit/>
+          </a:bodyPr>
+          <a:lstStyle/>
+          <a:p>
+            <a:pPr algn="ctr"/>
+            <a:r>
+              <a:rPr lang="en-US" b="1" dirty="0">
+                <a:solidFill>
+                  <a:srgbClr val="0070C0"/>
+                </a:solidFill>
+                <a:latin typeface="Arial" panose="020B0604020202020204" pitchFamily="34" charset="0"/>
+                <a:cs typeface="Arial" panose="020B0604020202020204" pitchFamily="34" charset="0"/>
+              </a:rPr>
+              <a:t>700nm</a:t>
+            </a:r>
+          </a:p>
+        </p:txBody>
+      </p:sp>
+    </p:spTree>
+    <p:extLst>
+      <p:ext uri="{BB962C8B-B14F-4D97-AF65-F5344CB8AC3E}">
+        <p14:creationId xmlns:p14="http://schemas.microsoft.com/office/powerpoint/2010/main" val="2375114488"/>
+      </p:ext>
+    </p:extLst>
+  </p:cSld>
+  <p:clrMapOvr>
+    <a:masterClrMapping/>
+  </p:clrMapOvr>
+</p:sld>
+</file>
+
+<file path=ppt/slides/slide33.xml><?xml version="1.0" encoding="utf-8"?>
+<p:sld xmlns:a="http://schemas.openxmlformats.org/drawingml/2006/main" xmlns:r="http://schemas.openxmlformats.org/officeDocument/2006/relationships" xmlns:p="http://schemas.openxmlformats.org/presentationml/2006/main">
+  <p:cSld>
+    <p:spTree>
+      <p:nvGrpSpPr>
+        <p:cNvPr id="1" name=""/>
+        <p:cNvGrpSpPr/>
+        <p:nvPr/>
+      </p:nvGrpSpPr>
+      <p:grpSpPr>
+        <a:xfrm>
+          <a:off x="0" y="0"/>
+          <a:ext cx="0" cy="0"/>
+          <a:chOff x="0" y="0"/>
+          <a:chExt cx="0" cy="0"/>
+        </a:xfrm>
+      </p:grpSpPr>
+      <p:pic>
+        <p:nvPicPr>
+          <p:cNvPr id="4" name="Content Placeholder 54" descr="A black lines on a white background&#10;&#10;Description automatically generated">
+            <a:extLst>
+              <a:ext uri="{FF2B5EF4-FFF2-40B4-BE49-F238E27FC236}">
+                <a16:creationId xmlns:a16="http://schemas.microsoft.com/office/drawing/2014/main" id="{8C206F52-3205-1BE4-969F-F35A3C534FFF}"/>
+              </a:ext>
+            </a:extLst>
+          </p:cNvPr>
+          <p:cNvPicPr>
+            <a:picLocks noChangeAspect="1"/>
+          </p:cNvPicPr>
+          <p:nvPr/>
+        </p:nvPicPr>
+        <p:blipFill>
+          <a:blip r:embed="rId2">
+            <a:extLst>
+              <a:ext uri="{BEBA8EAE-BF5A-486C-A8C5-ECC9F3942E4B}">
+                <a14:imgProps xmlns:a14="http://schemas.microsoft.com/office/drawing/2010/main">
+                  <a14:imgLayer r:embed="rId3">
+                    <a14:imgEffect>
+                      <a14:backgroundRemoval t="3509" b="89474" l="3056" r="96389">
+                        <a14:foregroundMark x1="44722" y1="5848" x2="44722" y2="5848"/>
+                        <a14:foregroundMark x1="58333" y1="47953" x2="58333" y2="47953"/>
+                        <a14:foregroundMark x1="96389" y1="49123" x2="96111" y2="49123"/>
+                        <a14:foregroundMark x1="8333" y1="47953" x2="8056" y2="47953"/>
+                        <a14:foregroundMark x1="3333" y1="47953" x2="3333" y2="47953"/>
+                        <a14:foregroundMark x1="57500" y1="3509" x2="57500" y2="3509"/>
+                      </a14:backgroundRemoval>
+                    </a14:imgEffect>
+                  </a14:imgLayer>
+                </a14:imgProps>
+              </a:ext>
+              <a:ext uri="{28A0092B-C50C-407E-A947-70E740481C1C}">
+                <a14:useLocalDpi xmlns:a14="http://schemas.microsoft.com/office/drawing/2010/main" val="0"/>
+              </a:ext>
+            </a:extLst>
+          </a:blip>
+          <a:stretch>
+            <a:fillRect/>
+          </a:stretch>
+        </p:blipFill>
+        <p:spPr>
+          <a:xfrm rot="16200000">
+            <a:off x="5591764" y="3856648"/>
+            <a:ext cx="740009" cy="351504"/>
+          </a:xfrm>
+          <a:prstGeom prst="rect">
+            <a:avLst/>
+          </a:prstGeom>
+          <a:noFill/>
+        </p:spPr>
+      </p:pic>
+      <p:sp>
+        <p:nvSpPr>
+          <p:cNvPr id="5" name="TextBox 4">
+            <a:extLst>
+              <a:ext uri="{FF2B5EF4-FFF2-40B4-BE49-F238E27FC236}">
+                <a16:creationId xmlns:a16="http://schemas.microsoft.com/office/drawing/2014/main" id="{8705CB8F-E8BC-B6D4-E86D-18BB17C1CC5E}"/>
+              </a:ext>
+            </a:extLst>
+          </p:cNvPr>
+          <p:cNvSpPr txBox="1"/>
+          <p:nvPr/>
+        </p:nvSpPr>
+        <p:spPr>
+          <a:xfrm>
+            <a:off x="4908507" y="4405708"/>
+            <a:ext cx="2286000" cy="338554"/>
+          </a:xfrm>
+          <a:prstGeom prst="rect">
+            <a:avLst/>
+          </a:prstGeom>
+          <a:noFill/>
+        </p:spPr>
+        <p:txBody>
+          <a:bodyPr wrap="square" rtlCol="0">
+            <a:spAutoFit/>
+          </a:bodyPr>
+          <a:lstStyle/>
+          <a:p>
+            <a:pPr algn="ctr"/>
+            <a:r>
+              <a:rPr lang="en-US" sz="1600" b="1" dirty="0">
+                <a:solidFill>
+                  <a:schemeClr val="bg1"/>
+                </a:solidFill>
+              </a:rPr>
+              <a:t>Digital</a:t>
+            </a:r>
+          </a:p>
+        </p:txBody>
+      </p:sp>
+      <p:sp>
+        <p:nvSpPr>
+          <p:cNvPr id="6" name="Rectangle 5">
+            <a:extLst>
+              <a:ext uri="{FF2B5EF4-FFF2-40B4-BE49-F238E27FC236}">
+                <a16:creationId xmlns:a16="http://schemas.microsoft.com/office/drawing/2014/main" id="{7AA13B2E-14C4-240A-ABEC-AC2B782865FD}"/>
+              </a:ext>
+            </a:extLst>
+          </p:cNvPr>
+          <p:cNvSpPr/>
+          <p:nvPr/>
+        </p:nvSpPr>
+        <p:spPr>
+          <a:xfrm rot="10800000" flipV="1">
+            <a:off x="4441312" y="2061924"/>
+            <a:ext cx="3040914" cy="873300"/>
+          </a:xfrm>
+          <a:prstGeom prst="rect">
+            <a:avLst/>
+          </a:prstGeom>
+          <a:solidFill>
+            <a:srgbClr val="A5A5A5">
+              <a:lumMod val="40000"/>
+              <a:lumOff val="60000"/>
+            </a:srgbClr>
+          </a:solidFill>
+          <a:ln w="6350" cap="flat" cmpd="sng" algn="ctr">
+            <a:solidFill>
+              <a:sysClr val="windowText" lastClr="000000"/>
+            </a:solidFill>
+            <a:prstDash val="solid"/>
+            <a:miter lim="800000"/>
+          </a:ln>
+          <a:effectLst/>
+        </p:spPr>
+        <p:txBody>
+          <a:bodyPr rtlCol="0" anchor="ctr"/>
+          <a:lstStyle/>
+          <a:p>
+            <a:pPr marL="0" marR="0" lvl="0" indent="0" algn="ctr" defTabSz="914400" eaLnBrk="1" fontAlgn="auto" latinLnBrk="0" hangingPunct="1">
+              <a:lnSpc>
+                <a:spcPct val="100000"/>
+              </a:lnSpc>
+              <a:spcBef>
+                <a:spcPts val="0"/>
+              </a:spcBef>
+              <a:spcAft>
+                <a:spcPts val="0"/>
+              </a:spcAft>
+              <a:buClrTx/>
+              <a:buSzTx/>
+              <a:buFontTx/>
+              <a:buNone/>
+              <a:tabLst/>
+              <a:defRPr/>
+            </a:pPr>
+            <a:r>
+              <a:rPr kumimoji="0" lang="en-US" sz="1600" b="0" i="0" u="none" strike="noStrike" kern="0" cap="none" spc="0" normalizeH="0" baseline="0" noProof="0" dirty="0">
+                <a:ln>
+                  <a:noFill/>
+                </a:ln>
+                <a:solidFill>
+                  <a:prstClr val="black"/>
+                </a:solidFill>
+                <a:effectLst/>
+                <a:uLnTx/>
+                <a:uFillTx/>
+                <a:latin typeface="Arial" panose="020B0604020202020204" pitchFamily="34" charset="0"/>
+                <a:ea typeface="+mn-ea"/>
+                <a:cs typeface="Arial" panose="020B0604020202020204" pitchFamily="34" charset="0"/>
+              </a:rPr>
+              <a:t>SOI2</a:t>
+            </a:r>
+          </a:p>
+        </p:txBody>
+      </p:sp>
+      <p:sp>
+        <p:nvSpPr>
+          <p:cNvPr id="8" name="Rectangle 7">
+            <a:extLst>
+              <a:ext uri="{FF2B5EF4-FFF2-40B4-BE49-F238E27FC236}">
+                <a16:creationId xmlns:a16="http://schemas.microsoft.com/office/drawing/2014/main" id="{9C22E354-0CB2-899B-9EFB-95A5E1C5D965}"/>
+              </a:ext>
+            </a:extLst>
+          </p:cNvPr>
+          <p:cNvSpPr/>
+          <p:nvPr/>
+        </p:nvSpPr>
+        <p:spPr>
+          <a:xfrm>
+            <a:off x="4441314" y="4744262"/>
+            <a:ext cx="3040912" cy="873300"/>
+          </a:xfrm>
+          <a:prstGeom prst="rect">
+            <a:avLst/>
+          </a:prstGeom>
+          <a:solidFill>
+            <a:srgbClr val="A5A5A5">
+              <a:lumMod val="40000"/>
+              <a:lumOff val="60000"/>
+            </a:srgbClr>
+          </a:solidFill>
+          <a:ln w="6350" cap="flat" cmpd="sng" algn="ctr">
+            <a:solidFill>
+              <a:sysClr val="windowText" lastClr="000000"/>
+            </a:solidFill>
+            <a:prstDash val="solid"/>
+            <a:miter lim="800000"/>
+          </a:ln>
+          <a:effectLst/>
+        </p:spPr>
+        <p:txBody>
+          <a:bodyPr rtlCol="0" anchor="ctr"/>
+          <a:lstStyle/>
+          <a:p>
+            <a:pPr marL="0" marR="0" lvl="0" indent="0" algn="ctr" defTabSz="914400" eaLnBrk="1" fontAlgn="auto" latinLnBrk="0" hangingPunct="1">
+              <a:lnSpc>
+                <a:spcPct val="100000"/>
+              </a:lnSpc>
+              <a:spcBef>
+                <a:spcPts val="0"/>
+              </a:spcBef>
+              <a:spcAft>
+                <a:spcPts val="0"/>
+              </a:spcAft>
+              <a:buClrTx/>
+              <a:buSzTx/>
+              <a:buFontTx/>
+              <a:buNone/>
+              <a:tabLst/>
+              <a:defRPr/>
+            </a:pPr>
+            <a:r>
+              <a:rPr kumimoji="0" lang="en-US" sz="1600" b="0" i="0" u="none" strike="noStrike" kern="0" cap="none" spc="0" normalizeH="0" baseline="0" noProof="0" dirty="0">
+                <a:ln>
+                  <a:noFill/>
+                </a:ln>
+                <a:solidFill>
+                  <a:prstClr val="black"/>
+                </a:solidFill>
+                <a:effectLst/>
+                <a:uLnTx/>
+                <a:uFillTx/>
+                <a:latin typeface="Arial" panose="020B0604020202020204" pitchFamily="34" charset="0"/>
+                <a:ea typeface="+mn-ea"/>
+                <a:cs typeface="Arial" panose="020B0604020202020204" pitchFamily="34" charset="0"/>
+              </a:rPr>
+              <a:t>SOI1</a:t>
+            </a:r>
+          </a:p>
+        </p:txBody>
+      </p:sp>
+      <p:sp>
+        <p:nvSpPr>
+          <p:cNvPr id="9" name="Rectangle 8">
+            <a:extLst>
+              <a:ext uri="{FF2B5EF4-FFF2-40B4-BE49-F238E27FC236}">
+                <a16:creationId xmlns:a16="http://schemas.microsoft.com/office/drawing/2014/main" id="{FE781847-E102-83B8-9FB2-8665AD69848C}"/>
+              </a:ext>
+            </a:extLst>
+          </p:cNvPr>
+          <p:cNvSpPr/>
+          <p:nvPr/>
+        </p:nvSpPr>
+        <p:spPr>
+          <a:xfrm rot="10800000" flipV="1">
+            <a:off x="4846880" y="2935799"/>
+            <a:ext cx="2188248" cy="220455"/>
+          </a:xfrm>
+          <a:prstGeom prst="rect">
+            <a:avLst/>
+          </a:prstGeom>
+          <a:solidFill>
+            <a:srgbClr val="70AD47">
+              <a:lumMod val="40000"/>
+              <a:lumOff val="60000"/>
+            </a:srgbClr>
+          </a:solidFill>
+          <a:ln w="6350" cap="flat" cmpd="sng" algn="ctr">
+            <a:solidFill>
+              <a:sysClr val="windowText" lastClr="000000"/>
+            </a:solidFill>
+            <a:prstDash val="solid"/>
+            <a:miter lim="800000"/>
+          </a:ln>
+          <a:effectLst/>
+        </p:spPr>
+        <p:txBody>
+          <a:bodyPr rtlCol="0" anchor="ctr"/>
+          <a:lstStyle/>
+          <a:p>
+            <a:pPr marL="0" marR="0" lvl="0" indent="0" algn="ctr" defTabSz="914400" eaLnBrk="1" fontAlgn="auto" latinLnBrk="0" hangingPunct="1">
+              <a:lnSpc>
+                <a:spcPct val="100000"/>
+              </a:lnSpc>
+              <a:spcBef>
+                <a:spcPts val="0"/>
+              </a:spcBef>
+              <a:spcAft>
+                <a:spcPts val="0"/>
+              </a:spcAft>
+              <a:buClrTx/>
+              <a:buSzTx/>
+              <a:buFontTx/>
+              <a:buNone/>
+              <a:tabLst/>
+              <a:defRPr/>
+            </a:pPr>
+            <a:r>
+              <a:rPr kumimoji="0" lang="en-US" sz="1600" b="0" i="0" u="none" strike="noStrike" kern="0" cap="none" spc="0" normalizeH="0" baseline="0" noProof="0" dirty="0">
+                <a:ln>
+                  <a:noFill/>
+                </a:ln>
+                <a:solidFill>
+                  <a:prstClr val="black"/>
+                </a:solidFill>
+                <a:effectLst/>
+                <a:uLnTx/>
+                <a:uFillTx/>
+                <a:latin typeface="Arial" panose="020B0604020202020204" pitchFamily="34" charset="0"/>
+                <a:ea typeface="+mn-ea"/>
+                <a:cs typeface="Arial" panose="020B0604020202020204" pitchFamily="34" charset="0"/>
+              </a:rPr>
+              <a:t>NITRIDE</a:t>
+            </a:r>
+          </a:p>
+        </p:txBody>
+      </p:sp>
+      <p:sp>
+        <p:nvSpPr>
+          <p:cNvPr id="10" name="Rectangle 9">
+            <a:extLst>
+              <a:ext uri="{FF2B5EF4-FFF2-40B4-BE49-F238E27FC236}">
+                <a16:creationId xmlns:a16="http://schemas.microsoft.com/office/drawing/2014/main" id="{04C8A864-037A-0492-C51B-56E324558339}"/>
+              </a:ext>
+            </a:extLst>
+          </p:cNvPr>
+          <p:cNvSpPr/>
+          <p:nvPr/>
+        </p:nvSpPr>
+        <p:spPr>
+          <a:xfrm rot="10800000" flipV="1">
+            <a:off x="4723716" y="3152794"/>
+            <a:ext cx="2411149" cy="338554"/>
+          </a:xfrm>
+          <a:prstGeom prst="rect">
+            <a:avLst/>
+          </a:prstGeom>
+          <a:solidFill>
+            <a:srgbClr val="ED7D31">
+              <a:lumMod val="40000"/>
+              <a:lumOff val="60000"/>
+            </a:srgbClr>
+          </a:solidFill>
+          <a:ln w="6350" cap="flat" cmpd="sng" algn="ctr">
+            <a:solidFill>
+              <a:sysClr val="windowText" lastClr="000000"/>
+            </a:solidFill>
+            <a:prstDash val="solid"/>
+            <a:miter lim="800000"/>
+          </a:ln>
+          <a:effectLst/>
+        </p:spPr>
+        <p:txBody>
+          <a:bodyPr rtlCol="0" anchor="ctr"/>
+          <a:lstStyle/>
+          <a:p>
+            <a:pPr marL="0" marR="0" lvl="0" indent="0" algn="ctr" defTabSz="914400" eaLnBrk="1" fontAlgn="auto" latinLnBrk="0" hangingPunct="1">
+              <a:lnSpc>
+                <a:spcPct val="100000"/>
+              </a:lnSpc>
+              <a:spcBef>
+                <a:spcPts val="0"/>
+              </a:spcBef>
+              <a:spcAft>
+                <a:spcPts val="0"/>
+              </a:spcAft>
+              <a:buClrTx/>
+              <a:buSzTx/>
+              <a:buFontTx/>
+              <a:buNone/>
+              <a:tabLst/>
+              <a:defRPr/>
+            </a:pPr>
+            <a:r>
+              <a:rPr kumimoji="0" lang="en-US" sz="1600" b="0" i="0" u="none" strike="noStrike" kern="0" cap="none" spc="0" normalizeH="0" baseline="0" noProof="0" dirty="0">
+                <a:ln>
+                  <a:noFill/>
+                </a:ln>
+                <a:solidFill>
+                  <a:prstClr val="black"/>
+                </a:solidFill>
+                <a:effectLst/>
+                <a:uLnTx/>
+                <a:uFillTx/>
+                <a:latin typeface="Arial" panose="020B0604020202020204" pitchFamily="34" charset="0"/>
+                <a:ea typeface="+mn-ea"/>
+                <a:cs typeface="Arial" panose="020B0604020202020204" pitchFamily="34" charset="0"/>
+              </a:rPr>
+              <a:t>POLY2</a:t>
+            </a:r>
+          </a:p>
+        </p:txBody>
+      </p:sp>
+      <p:sp>
+        <p:nvSpPr>
+          <p:cNvPr id="11" name="Rectangle 10">
+            <a:extLst>
+              <a:ext uri="{FF2B5EF4-FFF2-40B4-BE49-F238E27FC236}">
+                <a16:creationId xmlns:a16="http://schemas.microsoft.com/office/drawing/2014/main" id="{1C2F5003-6D5F-0880-DCA0-6FACE50A644B}"/>
+              </a:ext>
+            </a:extLst>
+          </p:cNvPr>
+          <p:cNvSpPr/>
+          <p:nvPr/>
+        </p:nvSpPr>
+        <p:spPr>
+          <a:xfrm rot="10800000" flipV="1">
+            <a:off x="4846879" y="3491004"/>
+            <a:ext cx="2188249" cy="342786"/>
+          </a:xfrm>
+          <a:prstGeom prst="rect">
+            <a:avLst/>
+          </a:prstGeom>
+          <a:solidFill>
+            <a:srgbClr val="FFC000">
+              <a:lumMod val="40000"/>
+              <a:lumOff val="60000"/>
+            </a:srgbClr>
+          </a:solidFill>
+          <a:ln w="6350" cap="flat" cmpd="sng" algn="ctr">
+            <a:solidFill>
+              <a:sysClr val="windowText" lastClr="000000"/>
+            </a:solidFill>
+            <a:prstDash val="solid"/>
+            <a:miter lim="800000"/>
+          </a:ln>
+          <a:effectLst/>
+        </p:spPr>
+        <p:txBody>
+          <a:bodyPr rtlCol="0" anchor="ctr"/>
+          <a:lstStyle/>
+          <a:p>
+            <a:pPr marL="0" marR="0" lvl="0" indent="0" algn="ctr" defTabSz="914400" eaLnBrk="1" fontAlgn="auto" latinLnBrk="0" hangingPunct="1">
+              <a:lnSpc>
+                <a:spcPct val="100000"/>
+              </a:lnSpc>
+              <a:spcBef>
+                <a:spcPts val="0"/>
+              </a:spcBef>
+              <a:spcAft>
+                <a:spcPts val="0"/>
+              </a:spcAft>
+              <a:buClrTx/>
+              <a:buSzTx/>
+              <a:buFontTx/>
+              <a:buNone/>
+              <a:tabLst/>
+              <a:defRPr/>
+            </a:pPr>
+            <a:r>
+              <a:rPr kumimoji="0" lang="en-US" sz="1600" b="0" i="0" u="none" strike="noStrike" kern="0" cap="none" spc="0" normalizeH="0" baseline="0" noProof="0" dirty="0">
+                <a:ln>
+                  <a:noFill/>
+                </a:ln>
+                <a:solidFill>
+                  <a:prstClr val="black"/>
+                </a:solidFill>
+                <a:effectLst/>
+                <a:uLnTx/>
+                <a:uFillTx/>
+                <a:latin typeface="Arial" panose="020B0604020202020204" pitchFamily="34" charset="0"/>
+                <a:ea typeface="+mn-ea"/>
+                <a:cs typeface="Arial" panose="020B0604020202020204" pitchFamily="34" charset="0"/>
+              </a:rPr>
+              <a:t>METAL2</a:t>
+            </a:r>
+          </a:p>
+        </p:txBody>
+      </p:sp>
+      <p:cxnSp>
+        <p:nvCxnSpPr>
+          <p:cNvPr id="12" name="Straight Arrow Connector 11">
+            <a:extLst>
+              <a:ext uri="{FF2B5EF4-FFF2-40B4-BE49-F238E27FC236}">
+                <a16:creationId xmlns:a16="http://schemas.microsoft.com/office/drawing/2014/main" id="{A6416AF1-E4EF-C77B-990D-32223FC776D3}"/>
+              </a:ext>
+            </a:extLst>
+          </p:cNvPr>
+          <p:cNvCxnSpPr>
+            <a:cxnSpLocks/>
+          </p:cNvCxnSpPr>
+          <p:nvPr/>
+        </p:nvCxnSpPr>
+        <p:spPr>
+          <a:xfrm>
+            <a:off x="7635537" y="4184594"/>
+            <a:ext cx="0" cy="559668"/>
+          </a:xfrm>
+          <a:prstGeom prst="straightConnector1">
+            <a:avLst/>
+          </a:prstGeom>
+          <a:ln>
+            <a:solidFill>
+              <a:schemeClr val="tx1"/>
+            </a:solidFill>
+            <a:headEnd type="triangle"/>
+            <a:tailEnd type="triangle"/>
+          </a:ln>
+        </p:spPr>
+        <p:style>
+          <a:lnRef idx="1">
+            <a:schemeClr val="accent1"/>
+          </a:lnRef>
+          <a:fillRef idx="0">
+            <a:schemeClr val="accent1"/>
+          </a:fillRef>
+          <a:effectRef idx="0">
+            <a:schemeClr val="accent1"/>
+          </a:effectRef>
+          <a:fontRef idx="minor">
+            <a:schemeClr val="tx1"/>
+          </a:fontRef>
+        </p:style>
+      </p:cxnSp>
+      <p:sp>
+        <p:nvSpPr>
+          <p:cNvPr id="13" name="TextBox 12">
+            <a:extLst>
+              <a:ext uri="{FF2B5EF4-FFF2-40B4-BE49-F238E27FC236}">
+                <a16:creationId xmlns:a16="http://schemas.microsoft.com/office/drawing/2014/main" id="{B2C91520-6E55-AD4C-996D-1C3520738A07}"/>
+              </a:ext>
+            </a:extLst>
+          </p:cNvPr>
+          <p:cNvSpPr txBox="1"/>
+          <p:nvPr/>
+        </p:nvSpPr>
+        <p:spPr>
+          <a:xfrm>
+            <a:off x="7788849" y="4279762"/>
+            <a:ext cx="905256" cy="369332"/>
+          </a:xfrm>
+          <a:prstGeom prst="rect">
+            <a:avLst/>
+          </a:prstGeom>
+          <a:noFill/>
+        </p:spPr>
+        <p:txBody>
+          <a:bodyPr wrap="square" rtlCol="0">
+            <a:spAutoFit/>
+          </a:bodyPr>
+          <a:lstStyle/>
+          <a:p>
+            <a:pPr algn="ctr"/>
+            <a:r>
+              <a:rPr lang="en-US" dirty="0">
+                <a:latin typeface="Arial" panose="020B0604020202020204" pitchFamily="34" charset="0"/>
+                <a:cs typeface="Arial" panose="020B0604020202020204" pitchFamily="34" charset="0"/>
+              </a:rPr>
+              <a:t>700nm</a:t>
+            </a:r>
+          </a:p>
+        </p:txBody>
+      </p:sp>
+      <p:cxnSp>
+        <p:nvCxnSpPr>
+          <p:cNvPr id="14" name="Straight Arrow Connector 13">
+            <a:extLst>
+              <a:ext uri="{FF2B5EF4-FFF2-40B4-BE49-F238E27FC236}">
+                <a16:creationId xmlns:a16="http://schemas.microsoft.com/office/drawing/2014/main" id="{647188FC-E8EF-DE1C-0D28-DA4AA17CE288}"/>
+              </a:ext>
+            </a:extLst>
+          </p:cNvPr>
+          <p:cNvCxnSpPr>
+            <a:cxnSpLocks/>
+          </p:cNvCxnSpPr>
+          <p:nvPr/>
+        </p:nvCxnSpPr>
+        <p:spPr>
+          <a:xfrm>
+            <a:off x="7635538" y="2935224"/>
+            <a:ext cx="0" cy="898566"/>
+          </a:xfrm>
+          <a:prstGeom prst="straightConnector1">
+            <a:avLst/>
+          </a:prstGeom>
+          <a:ln>
+            <a:solidFill>
+              <a:schemeClr val="tx1"/>
+            </a:solidFill>
+            <a:headEnd type="triangle"/>
+            <a:tailEnd type="triangle"/>
+          </a:ln>
+        </p:spPr>
+        <p:style>
+          <a:lnRef idx="1">
+            <a:schemeClr val="accent1"/>
+          </a:lnRef>
+          <a:fillRef idx="0">
+            <a:schemeClr val="accent1"/>
+          </a:fillRef>
+          <a:effectRef idx="0">
+            <a:schemeClr val="accent1"/>
+          </a:effectRef>
+          <a:fontRef idx="minor">
+            <a:schemeClr val="tx1"/>
+          </a:fontRef>
+        </p:style>
+      </p:cxnSp>
+      <p:sp>
+        <p:nvSpPr>
+          <p:cNvPr id="15" name="TextBox 14">
+            <a:extLst>
+              <a:ext uri="{FF2B5EF4-FFF2-40B4-BE49-F238E27FC236}">
+                <a16:creationId xmlns:a16="http://schemas.microsoft.com/office/drawing/2014/main" id="{3098541B-1910-B252-F8D2-8B98C2814A91}"/>
+              </a:ext>
+            </a:extLst>
+          </p:cNvPr>
+          <p:cNvSpPr txBox="1"/>
+          <p:nvPr/>
+        </p:nvSpPr>
+        <p:spPr>
+          <a:xfrm>
+            <a:off x="7735275" y="3152793"/>
+            <a:ext cx="1106181" cy="369332"/>
+          </a:xfrm>
+          <a:prstGeom prst="rect">
+            <a:avLst/>
+          </a:prstGeom>
+          <a:noFill/>
+        </p:spPr>
+        <p:txBody>
+          <a:bodyPr wrap="square" rtlCol="0">
+            <a:spAutoFit/>
+          </a:bodyPr>
+          <a:lstStyle/>
+          <a:p>
+            <a:pPr algn="ctr"/>
+            <a:r>
+              <a:rPr lang="en-US" dirty="0">
+                <a:latin typeface="Arial" panose="020B0604020202020204" pitchFamily="34" charset="0"/>
+                <a:cs typeface="Arial" panose="020B0604020202020204" pitchFamily="34" charset="0"/>
+              </a:rPr>
+              <a:t>1350nm</a:t>
+            </a:r>
+          </a:p>
+        </p:txBody>
+      </p:sp>
+      <p:cxnSp>
+        <p:nvCxnSpPr>
+          <p:cNvPr id="16" name="Straight Arrow Connector 15">
+            <a:extLst>
+              <a:ext uri="{FF2B5EF4-FFF2-40B4-BE49-F238E27FC236}">
+                <a16:creationId xmlns:a16="http://schemas.microsoft.com/office/drawing/2014/main" id="{570157DE-B63F-8265-7E88-9664596313ED}"/>
+              </a:ext>
+            </a:extLst>
+          </p:cNvPr>
+          <p:cNvCxnSpPr>
+            <a:cxnSpLocks/>
+          </p:cNvCxnSpPr>
+          <p:nvPr/>
+        </p:nvCxnSpPr>
+        <p:spPr>
+          <a:xfrm>
+            <a:off x="4320838" y="2954274"/>
+            <a:ext cx="0" cy="1805377"/>
+          </a:xfrm>
+          <a:prstGeom prst="straightConnector1">
+            <a:avLst/>
+          </a:prstGeom>
+          <a:ln>
+            <a:solidFill>
+              <a:schemeClr val="tx1"/>
+            </a:solidFill>
+            <a:headEnd type="triangle"/>
+            <a:tailEnd type="triangle"/>
+          </a:ln>
+        </p:spPr>
+        <p:style>
+          <a:lnRef idx="1">
+            <a:schemeClr val="accent1"/>
+          </a:lnRef>
+          <a:fillRef idx="0">
+            <a:schemeClr val="accent1"/>
+          </a:fillRef>
+          <a:effectRef idx="0">
+            <a:schemeClr val="accent1"/>
+          </a:effectRef>
+          <a:fontRef idx="minor">
+            <a:schemeClr val="tx1"/>
+          </a:fontRef>
+        </p:style>
+      </p:cxnSp>
+      <p:sp>
+        <p:nvSpPr>
+          <p:cNvPr id="17" name="TextBox 16">
+            <a:extLst>
+              <a:ext uri="{FF2B5EF4-FFF2-40B4-BE49-F238E27FC236}">
+                <a16:creationId xmlns:a16="http://schemas.microsoft.com/office/drawing/2014/main" id="{3000844F-F150-732F-D986-7ADB5D91106B}"/>
+              </a:ext>
+            </a:extLst>
+          </p:cNvPr>
+          <p:cNvSpPr txBox="1"/>
+          <p:nvPr/>
+        </p:nvSpPr>
+        <p:spPr>
+          <a:xfrm>
+            <a:off x="3110371" y="3771225"/>
+            <a:ext cx="1106181" cy="369332"/>
+          </a:xfrm>
+          <a:prstGeom prst="rect">
+            <a:avLst/>
+          </a:prstGeom>
+          <a:noFill/>
+        </p:spPr>
+        <p:txBody>
+          <a:bodyPr wrap="square" rtlCol="0">
+            <a:spAutoFit/>
+          </a:bodyPr>
+          <a:lstStyle/>
+          <a:p>
+            <a:pPr algn="ctr"/>
+            <a:r>
+              <a:rPr lang="en-US" dirty="0">
+                <a:latin typeface="Arial" panose="020B0604020202020204" pitchFamily="34" charset="0"/>
+                <a:cs typeface="Arial" panose="020B0604020202020204" pitchFamily="34" charset="0"/>
+              </a:rPr>
+              <a:t>2700nm</a:t>
+            </a:r>
+          </a:p>
+        </p:txBody>
+      </p:sp>
+      <p:cxnSp>
+        <p:nvCxnSpPr>
+          <p:cNvPr id="18" name="Straight Arrow Connector 17">
+            <a:extLst>
+              <a:ext uri="{FF2B5EF4-FFF2-40B4-BE49-F238E27FC236}">
+                <a16:creationId xmlns:a16="http://schemas.microsoft.com/office/drawing/2014/main" id="{3C1607BB-CBA8-37DB-EBF0-035A8B9F5D86}"/>
+              </a:ext>
+            </a:extLst>
+          </p:cNvPr>
+          <p:cNvCxnSpPr>
+            <a:cxnSpLocks/>
+          </p:cNvCxnSpPr>
+          <p:nvPr/>
+        </p:nvCxnSpPr>
+        <p:spPr>
+          <a:xfrm flipH="1">
+            <a:off x="7635537" y="3833790"/>
+            <a:ext cx="1" cy="350804"/>
+          </a:xfrm>
+          <a:prstGeom prst="straightConnector1">
+            <a:avLst/>
+          </a:prstGeom>
+          <a:ln>
+            <a:headEnd type="triangle"/>
+            <a:tailEnd type="triangle"/>
+          </a:ln>
+        </p:spPr>
+        <p:style>
+          <a:lnRef idx="1">
+            <a:schemeClr val="accent1"/>
+          </a:lnRef>
+          <a:fillRef idx="0">
+            <a:schemeClr val="accent1"/>
+          </a:fillRef>
+          <a:effectRef idx="0">
+            <a:schemeClr val="accent1"/>
+          </a:effectRef>
+          <a:fontRef idx="minor">
+            <a:schemeClr val="tx1"/>
+          </a:fontRef>
+        </p:style>
+      </p:cxnSp>
+      <p:sp>
+        <p:nvSpPr>
+          <p:cNvPr id="19" name="TextBox 18">
+            <a:extLst>
+              <a:ext uri="{FF2B5EF4-FFF2-40B4-BE49-F238E27FC236}">
+                <a16:creationId xmlns:a16="http://schemas.microsoft.com/office/drawing/2014/main" id="{D942CE74-4541-65AB-3AC3-464793D67D68}"/>
+              </a:ext>
+            </a:extLst>
+          </p:cNvPr>
+          <p:cNvSpPr txBox="1"/>
+          <p:nvPr/>
+        </p:nvSpPr>
+        <p:spPr>
+          <a:xfrm>
+            <a:off x="7796154" y="3824526"/>
+            <a:ext cx="910783" cy="369332"/>
+          </a:xfrm>
+          <a:prstGeom prst="rect">
+            <a:avLst/>
+          </a:prstGeom>
+          <a:noFill/>
+        </p:spPr>
+        <p:txBody>
+          <a:bodyPr wrap="square" rtlCol="0">
+            <a:spAutoFit/>
+          </a:bodyPr>
+          <a:lstStyle/>
+          <a:p>
+            <a:pPr algn="ctr"/>
+            <a:r>
+              <a:rPr lang="en-US" b="1" dirty="0">
+                <a:solidFill>
+                  <a:srgbClr val="0070C0"/>
+                </a:solidFill>
+                <a:latin typeface="Arial" panose="020B0604020202020204" pitchFamily="34" charset="0"/>
+                <a:cs typeface="Arial" panose="020B0604020202020204" pitchFamily="34" charset="0"/>
+              </a:rPr>
+              <a:t>650nm</a:t>
+            </a:r>
+          </a:p>
+        </p:txBody>
+      </p:sp>
+      <p:sp>
+        <p:nvSpPr>
+          <p:cNvPr id="20" name="Title 1">
+            <a:extLst>
+              <a:ext uri="{FF2B5EF4-FFF2-40B4-BE49-F238E27FC236}">
+                <a16:creationId xmlns:a16="http://schemas.microsoft.com/office/drawing/2014/main" id="{7793665E-3655-07DC-04B1-97FDA2BA3F3C}"/>
+              </a:ext>
+            </a:extLst>
+          </p:cNvPr>
+          <p:cNvSpPr>
+            <a:spLocks noGrp="1"/>
+          </p:cNvSpPr>
+          <p:nvPr>
+            <p:ph type="title"/>
+          </p:nvPr>
+        </p:nvSpPr>
+        <p:spPr>
+          <a:xfrm>
+            <a:off x="838200" y="365125"/>
+            <a:ext cx="10515600" cy="668147"/>
+          </a:xfrm>
+        </p:spPr>
+        <p:txBody>
+          <a:bodyPr>
+            <a:normAutofit/>
+          </a:bodyPr>
+          <a:lstStyle/>
+          <a:p>
+            <a:r>
+              <a:rPr lang="en-US" sz="4000" dirty="0"/>
+              <a:t>Vertical Poly-Air-Metal Capacitor (VPAM Cap)</a:t>
+            </a:r>
+          </a:p>
+        </p:txBody>
+      </p:sp>
+      <p:sp>
+        <p:nvSpPr>
+          <p:cNvPr id="21" name="Rectangle 20">
+            <a:extLst>
+              <a:ext uri="{FF2B5EF4-FFF2-40B4-BE49-F238E27FC236}">
+                <a16:creationId xmlns:a16="http://schemas.microsoft.com/office/drawing/2014/main" id="{E317A7DA-82FD-5F51-C77F-24FBEE7681F4}"/>
+              </a:ext>
+            </a:extLst>
+          </p:cNvPr>
+          <p:cNvSpPr/>
+          <p:nvPr/>
+        </p:nvSpPr>
+        <p:spPr>
+          <a:xfrm rot="10800000" flipV="1">
+            <a:off x="4867645" y="4523207"/>
+            <a:ext cx="2188248" cy="220455"/>
+          </a:xfrm>
+          <a:prstGeom prst="rect">
+            <a:avLst/>
+          </a:prstGeom>
+          <a:solidFill>
+            <a:srgbClr val="70AD47">
+              <a:lumMod val="40000"/>
+              <a:lumOff val="60000"/>
+            </a:srgbClr>
+          </a:solidFill>
+          <a:ln w="6350" cap="flat" cmpd="sng" algn="ctr">
+            <a:solidFill>
+              <a:sysClr val="windowText" lastClr="000000"/>
+            </a:solidFill>
+            <a:prstDash val="solid"/>
+            <a:miter lim="800000"/>
+          </a:ln>
+          <a:effectLst/>
+        </p:spPr>
+        <p:txBody>
+          <a:bodyPr rtlCol="0" anchor="ctr"/>
+          <a:lstStyle/>
+          <a:p>
+            <a:pPr marL="0" marR="0" lvl="0" indent="0" algn="ctr" defTabSz="914400" eaLnBrk="1" fontAlgn="auto" latinLnBrk="0" hangingPunct="1">
+              <a:lnSpc>
+                <a:spcPct val="100000"/>
+              </a:lnSpc>
+              <a:spcBef>
+                <a:spcPts val="0"/>
+              </a:spcBef>
+              <a:spcAft>
+                <a:spcPts val="0"/>
+              </a:spcAft>
+              <a:buClrTx/>
+              <a:buSzTx/>
+              <a:buFontTx/>
+              <a:buNone/>
+              <a:tabLst/>
+              <a:defRPr/>
+            </a:pPr>
+            <a:r>
+              <a:rPr kumimoji="0" lang="en-US" sz="1600" b="0" i="0" u="none" strike="noStrike" kern="0" cap="none" spc="0" normalizeH="0" baseline="0" noProof="0" dirty="0">
+                <a:ln>
+                  <a:noFill/>
+                </a:ln>
+                <a:solidFill>
+                  <a:prstClr val="black"/>
+                </a:solidFill>
+                <a:effectLst/>
+                <a:uLnTx/>
+                <a:uFillTx/>
+                <a:latin typeface="Arial" panose="020B0604020202020204" pitchFamily="34" charset="0"/>
+                <a:ea typeface="+mn-ea"/>
+                <a:cs typeface="Arial" panose="020B0604020202020204" pitchFamily="34" charset="0"/>
+              </a:rPr>
+              <a:t>NITRIDE</a:t>
+            </a:r>
+          </a:p>
+        </p:txBody>
+      </p:sp>
+      <p:sp>
+        <p:nvSpPr>
+          <p:cNvPr id="22" name="Rectangle 21">
+            <a:extLst>
+              <a:ext uri="{FF2B5EF4-FFF2-40B4-BE49-F238E27FC236}">
+                <a16:creationId xmlns:a16="http://schemas.microsoft.com/office/drawing/2014/main" id="{5D0657D4-AA3E-0BEC-FDC3-5D1BF480ED97}"/>
+              </a:ext>
+            </a:extLst>
+          </p:cNvPr>
+          <p:cNvSpPr/>
+          <p:nvPr/>
+        </p:nvSpPr>
+        <p:spPr>
+          <a:xfrm rot="10800000" flipV="1">
+            <a:off x="4760291" y="4184594"/>
+            <a:ext cx="2411149" cy="338554"/>
+          </a:xfrm>
+          <a:prstGeom prst="rect">
+            <a:avLst/>
+          </a:prstGeom>
+          <a:solidFill>
+            <a:srgbClr val="ED7D31">
+              <a:lumMod val="40000"/>
+              <a:lumOff val="60000"/>
+            </a:srgbClr>
+          </a:solidFill>
+          <a:ln w="6350" cap="flat" cmpd="sng" algn="ctr">
+            <a:solidFill>
+              <a:sysClr val="windowText" lastClr="000000"/>
+            </a:solidFill>
+            <a:prstDash val="solid"/>
+            <a:miter lim="800000"/>
+          </a:ln>
+          <a:effectLst/>
+        </p:spPr>
+        <p:txBody>
+          <a:bodyPr rtlCol="0" anchor="ctr"/>
+          <a:lstStyle/>
+          <a:p>
+            <a:pPr marL="0" marR="0" lvl="0" indent="0" algn="ctr" defTabSz="914400" eaLnBrk="1" fontAlgn="auto" latinLnBrk="0" hangingPunct="1">
+              <a:lnSpc>
+                <a:spcPct val="100000"/>
+              </a:lnSpc>
+              <a:spcBef>
+                <a:spcPts val="0"/>
+              </a:spcBef>
+              <a:spcAft>
+                <a:spcPts val="0"/>
+              </a:spcAft>
+              <a:buClrTx/>
+              <a:buSzTx/>
+              <a:buFontTx/>
+              <a:buNone/>
+              <a:tabLst/>
+              <a:defRPr/>
+            </a:pPr>
+            <a:r>
+              <a:rPr kumimoji="0" lang="en-US" sz="1600" b="0" i="0" u="none" strike="noStrike" kern="0" cap="none" spc="0" normalizeH="0" baseline="0" noProof="0" dirty="0">
+                <a:ln>
+                  <a:noFill/>
+                </a:ln>
+                <a:solidFill>
+                  <a:prstClr val="black"/>
+                </a:solidFill>
+                <a:effectLst/>
+                <a:uLnTx/>
+                <a:uFillTx/>
+                <a:latin typeface="Arial" panose="020B0604020202020204" pitchFamily="34" charset="0"/>
+                <a:ea typeface="+mn-ea"/>
+                <a:cs typeface="Arial" panose="020B0604020202020204" pitchFamily="34" charset="0"/>
+              </a:rPr>
+              <a:t>POLY1</a:t>
+            </a:r>
+          </a:p>
+        </p:txBody>
+      </p:sp>
+    </p:spTree>
+    <p:extLst>
+      <p:ext uri="{BB962C8B-B14F-4D97-AF65-F5344CB8AC3E}">
+        <p14:creationId xmlns:p14="http://schemas.microsoft.com/office/powerpoint/2010/main" val="2645417744"/>
+      </p:ext>
+    </p:extLst>
+  </p:cSld>
+  <p:clrMapOvr>
+    <a:masterClrMapping/>
+  </p:clrMapOvr>
+</p:sld>
+</file>
+
+<file path=ppt/slides/slide34.xml><?xml version="1.0" encoding="utf-8"?>
+<p:sld xmlns:a="http://schemas.openxmlformats.org/drawingml/2006/main" xmlns:r="http://schemas.openxmlformats.org/officeDocument/2006/relationships" xmlns:p="http://schemas.openxmlformats.org/presentationml/2006/main">
+  <p:cSld>
+    <p:spTree>
+      <p:nvGrpSpPr>
+        <p:cNvPr id="1" name=""/>
+        <p:cNvGrpSpPr/>
+        <p:nvPr/>
+      </p:nvGrpSpPr>
+      <p:grpSpPr>
+        <a:xfrm>
+          <a:off x="0" y="0"/>
+          <a:ext cx="0" cy="0"/>
+          <a:chOff x="0" y="0"/>
+          <a:chExt cx="0" cy="0"/>
+        </a:xfrm>
+      </p:grpSpPr>
+      <p:sp>
+        <p:nvSpPr>
+          <p:cNvPr id="6" name="Rectangle 5">
+            <a:extLst>
+              <a:ext uri="{FF2B5EF4-FFF2-40B4-BE49-F238E27FC236}">
+                <a16:creationId xmlns:a16="http://schemas.microsoft.com/office/drawing/2014/main" id="{CB35B997-F534-1191-DED8-89857434F1EF}"/>
+              </a:ext>
+            </a:extLst>
+          </p:cNvPr>
+          <p:cNvSpPr/>
+          <p:nvPr/>
+        </p:nvSpPr>
+        <p:spPr>
+          <a:xfrm>
+            <a:off x="336895" y="1925765"/>
+            <a:ext cx="4957889" cy="620016"/>
+          </a:xfrm>
+          <a:prstGeom prst="rect">
+            <a:avLst/>
+          </a:prstGeom>
+          <a:solidFill>
+            <a:schemeClr val="accent3">
+              <a:lumMod val="40000"/>
+              <a:lumOff val="60000"/>
+            </a:schemeClr>
+          </a:solidFill>
+          <a:ln w="6350">
+            <a:solidFill>
+              <a:schemeClr val="tx1"/>
+            </a:solidFill>
+          </a:ln>
+        </p:spPr>
+        <p:style>
+          <a:lnRef idx="2">
+            <a:schemeClr val="accent1">
+              <a:shade val="50000"/>
+            </a:schemeClr>
+          </a:lnRef>
+          <a:fillRef idx="1">
+            <a:schemeClr val="accent1"/>
+          </a:fillRef>
+          <a:effectRef idx="0">
+            <a:schemeClr val="accent1"/>
+          </a:effectRef>
+          <a:fontRef idx="minor">
+            <a:schemeClr val="lt1"/>
+          </a:fontRef>
+        </p:style>
+        <p:txBody>
+          <a:bodyPr rtlCol="0" anchor="ctr"/>
+          <a:lstStyle/>
+          <a:p>
+            <a:pPr algn="ctr"/>
+            <a:r>
+              <a:rPr lang="en-US" dirty="0">
+                <a:solidFill>
+                  <a:schemeClr val="tx1"/>
+                </a:solidFill>
+                <a:latin typeface="Arial" panose="020B0604020202020204" pitchFamily="34" charset="0"/>
+                <a:cs typeface="Arial" panose="020B0604020202020204" pitchFamily="34" charset="0"/>
+              </a:rPr>
+              <a:t>SOI1</a:t>
+            </a:r>
+          </a:p>
+        </p:txBody>
+      </p:sp>
+      <p:sp>
+        <p:nvSpPr>
+          <p:cNvPr id="7" name="Rectangle 6">
+            <a:extLst>
+              <a:ext uri="{FF2B5EF4-FFF2-40B4-BE49-F238E27FC236}">
+                <a16:creationId xmlns:a16="http://schemas.microsoft.com/office/drawing/2014/main" id="{3D1A823F-74D2-63B0-B87B-E6279B702E7C}"/>
+              </a:ext>
+            </a:extLst>
+          </p:cNvPr>
+          <p:cNvSpPr/>
+          <p:nvPr/>
+        </p:nvSpPr>
+        <p:spPr>
+          <a:xfrm>
+            <a:off x="336895" y="1362524"/>
+            <a:ext cx="4957888" cy="342786"/>
+          </a:xfrm>
+          <a:prstGeom prst="rect">
+            <a:avLst/>
+          </a:prstGeom>
+          <a:solidFill>
+            <a:schemeClr val="accent2">
+              <a:lumMod val="40000"/>
+              <a:lumOff val="60000"/>
+            </a:schemeClr>
+          </a:solidFill>
+          <a:ln w="6350">
+            <a:solidFill>
+              <a:schemeClr val="tx1"/>
+            </a:solidFill>
+          </a:ln>
+        </p:spPr>
+        <p:style>
+          <a:lnRef idx="2">
+            <a:schemeClr val="accent1">
+              <a:shade val="50000"/>
+            </a:schemeClr>
+          </a:lnRef>
+          <a:fillRef idx="1">
+            <a:schemeClr val="accent1"/>
+          </a:fillRef>
+          <a:effectRef idx="0">
+            <a:schemeClr val="accent1"/>
+          </a:effectRef>
+          <a:fontRef idx="minor">
+            <a:schemeClr val="lt1"/>
+          </a:fontRef>
+        </p:style>
+        <p:txBody>
+          <a:bodyPr rtlCol="0" anchor="ctr"/>
+          <a:lstStyle/>
+          <a:p>
+            <a:pPr algn="ctr"/>
+            <a:r>
+              <a:rPr lang="en-US" sz="1600" dirty="0">
+                <a:solidFill>
+                  <a:schemeClr val="tx1"/>
+                </a:solidFill>
+                <a:latin typeface="Arial" panose="020B0604020202020204" pitchFamily="34" charset="0"/>
+                <a:cs typeface="Arial" panose="020B0604020202020204" pitchFamily="34" charset="0"/>
+              </a:rPr>
+              <a:t>POLY1</a:t>
+            </a:r>
+          </a:p>
+        </p:txBody>
+      </p:sp>
+      <p:sp>
+        <p:nvSpPr>
+          <p:cNvPr id="8" name="Rectangle 7">
+            <a:extLst>
+              <a:ext uri="{FF2B5EF4-FFF2-40B4-BE49-F238E27FC236}">
+                <a16:creationId xmlns:a16="http://schemas.microsoft.com/office/drawing/2014/main" id="{6E157B61-96D7-9A78-65F9-ADFE4590D6E8}"/>
+              </a:ext>
+            </a:extLst>
+          </p:cNvPr>
+          <p:cNvSpPr/>
+          <p:nvPr/>
+        </p:nvSpPr>
+        <p:spPr>
+          <a:xfrm>
+            <a:off x="336895" y="1705310"/>
+            <a:ext cx="4957888" cy="220455"/>
+          </a:xfrm>
+          <a:prstGeom prst="rect">
+            <a:avLst/>
+          </a:prstGeom>
+          <a:solidFill>
+            <a:schemeClr val="accent6">
+              <a:lumMod val="40000"/>
+              <a:lumOff val="60000"/>
+            </a:schemeClr>
+          </a:solidFill>
+          <a:ln w="6350">
+            <a:solidFill>
+              <a:schemeClr val="tx1"/>
+            </a:solidFill>
+          </a:ln>
+        </p:spPr>
+        <p:style>
+          <a:lnRef idx="2">
+            <a:schemeClr val="accent1">
+              <a:shade val="50000"/>
+            </a:schemeClr>
+          </a:lnRef>
+          <a:fillRef idx="1">
+            <a:schemeClr val="accent1"/>
+          </a:fillRef>
+          <a:effectRef idx="0">
+            <a:schemeClr val="accent1"/>
+          </a:effectRef>
+          <a:fontRef idx="minor">
+            <a:schemeClr val="lt1"/>
+          </a:fontRef>
+        </p:style>
+        <p:txBody>
+          <a:bodyPr rtlCol="0" anchor="ctr"/>
+          <a:lstStyle/>
+          <a:p>
+            <a:pPr algn="ctr"/>
+            <a:r>
+              <a:rPr lang="en-US" sz="1600" dirty="0">
+                <a:solidFill>
+                  <a:schemeClr val="tx1"/>
+                </a:solidFill>
+                <a:latin typeface="Arial" panose="020B0604020202020204" pitchFamily="34" charset="0"/>
+                <a:cs typeface="Arial" panose="020B0604020202020204" pitchFamily="34" charset="0"/>
+              </a:rPr>
+              <a:t>NITRIDE</a:t>
+            </a:r>
+          </a:p>
+        </p:txBody>
+      </p:sp>
+      <p:sp>
+        <p:nvSpPr>
+          <p:cNvPr id="9" name="Rectangle 8">
+            <a:extLst>
+              <a:ext uri="{FF2B5EF4-FFF2-40B4-BE49-F238E27FC236}">
+                <a16:creationId xmlns:a16="http://schemas.microsoft.com/office/drawing/2014/main" id="{BE5CC7FF-DE86-3103-FB25-DE9865267EF8}"/>
+              </a:ext>
+            </a:extLst>
+          </p:cNvPr>
+          <p:cNvSpPr/>
+          <p:nvPr/>
+        </p:nvSpPr>
+        <p:spPr>
+          <a:xfrm>
+            <a:off x="336895" y="1019738"/>
+            <a:ext cx="4957888" cy="342786"/>
+          </a:xfrm>
+          <a:prstGeom prst="rect">
+            <a:avLst/>
+          </a:prstGeom>
+          <a:solidFill>
+            <a:schemeClr val="accent4">
+              <a:lumMod val="40000"/>
+              <a:lumOff val="60000"/>
+            </a:schemeClr>
+          </a:solidFill>
+          <a:ln w="6350">
+            <a:solidFill>
+              <a:schemeClr val="tx1"/>
+            </a:solidFill>
+          </a:ln>
+        </p:spPr>
+        <p:style>
+          <a:lnRef idx="2">
+            <a:schemeClr val="accent1">
+              <a:shade val="50000"/>
+            </a:schemeClr>
+          </a:lnRef>
+          <a:fillRef idx="1">
+            <a:schemeClr val="accent1"/>
+          </a:fillRef>
+          <a:effectRef idx="0">
+            <a:schemeClr val="accent1"/>
+          </a:effectRef>
+          <a:fontRef idx="minor">
+            <a:schemeClr val="lt1"/>
+          </a:fontRef>
+        </p:style>
+        <p:txBody>
+          <a:bodyPr rtlCol="0" anchor="ctr"/>
+          <a:lstStyle/>
+          <a:p>
+            <a:pPr algn="ctr"/>
+            <a:r>
+              <a:rPr lang="en-US" sz="1600" dirty="0">
+                <a:solidFill>
+                  <a:schemeClr val="tx1"/>
+                </a:solidFill>
+                <a:latin typeface="Arial" panose="020B0604020202020204" pitchFamily="34" charset="0"/>
+                <a:cs typeface="Arial" panose="020B0604020202020204" pitchFamily="34" charset="0"/>
+              </a:rPr>
+              <a:t>METAL1</a:t>
+            </a:r>
+          </a:p>
+        </p:txBody>
+      </p:sp>
+      <p:sp>
+        <p:nvSpPr>
+          <p:cNvPr id="10" name="Rectangle 9">
+            <a:extLst>
+              <a:ext uri="{FF2B5EF4-FFF2-40B4-BE49-F238E27FC236}">
+                <a16:creationId xmlns:a16="http://schemas.microsoft.com/office/drawing/2014/main" id="{567E3D49-0B78-8CB0-BFE9-FB47B7E91D39}"/>
+              </a:ext>
+            </a:extLst>
+          </p:cNvPr>
+          <p:cNvSpPr/>
+          <p:nvPr/>
+        </p:nvSpPr>
+        <p:spPr>
+          <a:xfrm>
+            <a:off x="5556098" y="1925765"/>
+            <a:ext cx="4957889" cy="620016"/>
+          </a:xfrm>
+          <a:prstGeom prst="rect">
+            <a:avLst/>
+          </a:prstGeom>
+          <a:solidFill>
+            <a:schemeClr val="accent3">
+              <a:lumMod val="40000"/>
+              <a:lumOff val="60000"/>
+            </a:schemeClr>
+          </a:solidFill>
+          <a:ln w="6350">
+            <a:solidFill>
+              <a:schemeClr val="tx1"/>
+            </a:solidFill>
+          </a:ln>
+        </p:spPr>
+        <p:style>
+          <a:lnRef idx="2">
+            <a:schemeClr val="accent1">
+              <a:shade val="50000"/>
+            </a:schemeClr>
+          </a:lnRef>
+          <a:fillRef idx="1">
+            <a:schemeClr val="accent1"/>
+          </a:fillRef>
+          <a:effectRef idx="0">
+            <a:schemeClr val="accent1"/>
+          </a:effectRef>
+          <a:fontRef idx="minor">
+            <a:schemeClr val="lt1"/>
+          </a:fontRef>
+        </p:style>
+        <p:txBody>
+          <a:bodyPr rtlCol="0" anchor="ctr"/>
+          <a:lstStyle/>
+          <a:p>
+            <a:pPr algn="ctr"/>
+            <a:r>
+              <a:rPr lang="en-US" dirty="0">
+                <a:solidFill>
+                  <a:schemeClr val="tx1"/>
+                </a:solidFill>
+                <a:latin typeface="Arial" panose="020B0604020202020204" pitchFamily="34" charset="0"/>
+                <a:cs typeface="Arial" panose="020B0604020202020204" pitchFamily="34" charset="0"/>
+              </a:rPr>
+              <a:t>SOI2</a:t>
+            </a:r>
+          </a:p>
+        </p:txBody>
+      </p:sp>
+      <p:sp>
+        <p:nvSpPr>
+          <p:cNvPr id="11" name="Rectangle 10">
+            <a:extLst>
+              <a:ext uri="{FF2B5EF4-FFF2-40B4-BE49-F238E27FC236}">
+                <a16:creationId xmlns:a16="http://schemas.microsoft.com/office/drawing/2014/main" id="{DF9831A4-665E-00B1-A1F3-4C5BB502C758}"/>
+              </a:ext>
+            </a:extLst>
+          </p:cNvPr>
+          <p:cNvSpPr/>
+          <p:nvPr/>
+        </p:nvSpPr>
+        <p:spPr>
+          <a:xfrm>
+            <a:off x="5556098" y="1362524"/>
+            <a:ext cx="4957888" cy="342786"/>
+          </a:xfrm>
+          <a:prstGeom prst="rect">
+            <a:avLst/>
+          </a:prstGeom>
+          <a:solidFill>
+            <a:schemeClr val="accent2">
+              <a:lumMod val="40000"/>
+              <a:lumOff val="60000"/>
+            </a:schemeClr>
+          </a:solidFill>
+          <a:ln w="6350">
+            <a:solidFill>
+              <a:schemeClr val="tx1"/>
+            </a:solidFill>
+          </a:ln>
+        </p:spPr>
+        <p:style>
+          <a:lnRef idx="2">
+            <a:schemeClr val="accent1">
+              <a:shade val="50000"/>
+            </a:schemeClr>
+          </a:lnRef>
+          <a:fillRef idx="1">
+            <a:schemeClr val="accent1"/>
+          </a:fillRef>
+          <a:effectRef idx="0">
+            <a:schemeClr val="accent1"/>
+          </a:effectRef>
+          <a:fontRef idx="minor">
+            <a:schemeClr val="lt1"/>
+          </a:fontRef>
+        </p:style>
+        <p:txBody>
+          <a:bodyPr rtlCol="0" anchor="ctr"/>
+          <a:lstStyle/>
+          <a:p>
+            <a:pPr algn="ctr"/>
+            <a:r>
+              <a:rPr lang="en-US" sz="1600" dirty="0">
+                <a:solidFill>
+                  <a:schemeClr val="tx1"/>
+                </a:solidFill>
+                <a:latin typeface="Arial" panose="020B0604020202020204" pitchFamily="34" charset="0"/>
+                <a:cs typeface="Arial" panose="020B0604020202020204" pitchFamily="34" charset="0"/>
+              </a:rPr>
+              <a:t>POLY2</a:t>
+            </a:r>
+          </a:p>
+        </p:txBody>
+      </p:sp>
+      <p:sp>
+        <p:nvSpPr>
+          <p:cNvPr id="12" name="Rectangle 11">
+            <a:extLst>
+              <a:ext uri="{FF2B5EF4-FFF2-40B4-BE49-F238E27FC236}">
+                <a16:creationId xmlns:a16="http://schemas.microsoft.com/office/drawing/2014/main" id="{521A93E0-6EB1-B88E-F1AD-F1423B00BC90}"/>
+              </a:ext>
+            </a:extLst>
+          </p:cNvPr>
+          <p:cNvSpPr/>
+          <p:nvPr/>
+        </p:nvSpPr>
+        <p:spPr>
+          <a:xfrm>
+            <a:off x="5556098" y="1705310"/>
+            <a:ext cx="4957888" cy="220455"/>
+          </a:xfrm>
+          <a:prstGeom prst="rect">
+            <a:avLst/>
+          </a:prstGeom>
+          <a:solidFill>
+            <a:schemeClr val="accent6">
+              <a:lumMod val="40000"/>
+              <a:lumOff val="60000"/>
+            </a:schemeClr>
+          </a:solidFill>
+          <a:ln w="6350">
+            <a:solidFill>
+              <a:schemeClr val="tx1"/>
+            </a:solidFill>
+          </a:ln>
+        </p:spPr>
+        <p:style>
+          <a:lnRef idx="2">
+            <a:schemeClr val="accent1">
+              <a:shade val="50000"/>
+            </a:schemeClr>
+          </a:lnRef>
+          <a:fillRef idx="1">
+            <a:schemeClr val="accent1"/>
+          </a:fillRef>
+          <a:effectRef idx="0">
+            <a:schemeClr val="accent1"/>
+          </a:effectRef>
+          <a:fontRef idx="minor">
+            <a:schemeClr val="lt1"/>
+          </a:fontRef>
+        </p:style>
+        <p:txBody>
+          <a:bodyPr rtlCol="0" anchor="ctr"/>
+          <a:lstStyle/>
+          <a:p>
+            <a:pPr algn="ctr"/>
+            <a:r>
+              <a:rPr lang="en-US" sz="1600" dirty="0">
+                <a:solidFill>
+                  <a:schemeClr val="tx1"/>
+                </a:solidFill>
+                <a:latin typeface="Arial" panose="020B0604020202020204" pitchFamily="34" charset="0"/>
+                <a:cs typeface="Arial" panose="020B0604020202020204" pitchFamily="34" charset="0"/>
+              </a:rPr>
+              <a:t>NITRIDE</a:t>
+            </a:r>
+          </a:p>
+        </p:txBody>
+      </p:sp>
+      <p:sp>
+        <p:nvSpPr>
+          <p:cNvPr id="13" name="Rectangle 12">
+            <a:extLst>
+              <a:ext uri="{FF2B5EF4-FFF2-40B4-BE49-F238E27FC236}">
+                <a16:creationId xmlns:a16="http://schemas.microsoft.com/office/drawing/2014/main" id="{2AD7343B-FA3C-9541-1980-644008AA7535}"/>
+              </a:ext>
+            </a:extLst>
+          </p:cNvPr>
+          <p:cNvSpPr/>
+          <p:nvPr/>
+        </p:nvSpPr>
+        <p:spPr>
+          <a:xfrm>
+            <a:off x="5556098" y="1019738"/>
+            <a:ext cx="4957888" cy="342786"/>
+          </a:xfrm>
+          <a:prstGeom prst="rect">
+            <a:avLst/>
+          </a:prstGeom>
+          <a:solidFill>
+            <a:schemeClr val="accent4">
+              <a:lumMod val="40000"/>
+              <a:lumOff val="60000"/>
+            </a:schemeClr>
+          </a:solidFill>
+          <a:ln w="6350">
+            <a:solidFill>
+              <a:schemeClr val="tx1"/>
+            </a:solidFill>
+          </a:ln>
+        </p:spPr>
+        <p:style>
+          <a:lnRef idx="2">
+            <a:schemeClr val="accent1">
+              <a:shade val="50000"/>
+            </a:schemeClr>
+          </a:lnRef>
+          <a:fillRef idx="1">
+            <a:schemeClr val="accent1"/>
+          </a:fillRef>
+          <a:effectRef idx="0">
+            <a:schemeClr val="accent1"/>
+          </a:effectRef>
+          <a:fontRef idx="minor">
+            <a:schemeClr val="lt1"/>
+          </a:fontRef>
+        </p:style>
+        <p:txBody>
+          <a:bodyPr rtlCol="0" anchor="ctr"/>
+          <a:lstStyle/>
+          <a:p>
+            <a:pPr algn="ctr"/>
+            <a:r>
+              <a:rPr lang="en-US" sz="1600" dirty="0">
+                <a:solidFill>
+                  <a:schemeClr val="tx1"/>
+                </a:solidFill>
+                <a:latin typeface="Arial" panose="020B0604020202020204" pitchFamily="34" charset="0"/>
+                <a:cs typeface="Arial" panose="020B0604020202020204" pitchFamily="34" charset="0"/>
+              </a:rPr>
+              <a:t>METAL2</a:t>
+            </a:r>
+          </a:p>
+        </p:txBody>
+      </p:sp>
+      <p:sp>
+        <p:nvSpPr>
+          <p:cNvPr id="14" name="Rectangle 13">
+            <a:extLst>
+              <a:ext uri="{FF2B5EF4-FFF2-40B4-BE49-F238E27FC236}">
+                <a16:creationId xmlns:a16="http://schemas.microsoft.com/office/drawing/2014/main" id="{2B2CBF81-7C0A-EB89-1E73-FCE463CEA4F6}"/>
+              </a:ext>
+            </a:extLst>
+          </p:cNvPr>
+          <p:cNvSpPr/>
+          <p:nvPr/>
+        </p:nvSpPr>
+        <p:spPr>
+          <a:xfrm>
+            <a:off x="2946495" y="5864604"/>
+            <a:ext cx="4957889" cy="620016"/>
+          </a:xfrm>
+          <a:prstGeom prst="rect">
+            <a:avLst/>
+          </a:prstGeom>
+          <a:solidFill>
+            <a:schemeClr val="accent3">
+              <a:lumMod val="40000"/>
+              <a:lumOff val="60000"/>
+            </a:schemeClr>
+          </a:solidFill>
+          <a:ln w="6350">
+            <a:solidFill>
+              <a:schemeClr val="tx1"/>
+            </a:solidFill>
+          </a:ln>
+        </p:spPr>
+        <p:style>
+          <a:lnRef idx="2">
+            <a:schemeClr val="accent1">
+              <a:shade val="50000"/>
+            </a:schemeClr>
+          </a:lnRef>
+          <a:fillRef idx="1">
+            <a:schemeClr val="accent1"/>
+          </a:fillRef>
+          <a:effectRef idx="0">
+            <a:schemeClr val="accent1"/>
+          </a:effectRef>
+          <a:fontRef idx="minor">
+            <a:schemeClr val="lt1"/>
+          </a:fontRef>
+        </p:style>
+        <p:txBody>
+          <a:bodyPr rtlCol="0" anchor="ctr"/>
+          <a:lstStyle/>
+          <a:p>
+            <a:pPr algn="ctr"/>
+            <a:r>
+              <a:rPr lang="en-US" dirty="0">
+                <a:solidFill>
+                  <a:schemeClr val="tx1"/>
+                </a:solidFill>
+                <a:latin typeface="Arial" panose="020B0604020202020204" pitchFamily="34" charset="0"/>
+                <a:cs typeface="Arial" panose="020B0604020202020204" pitchFamily="34" charset="0"/>
+              </a:rPr>
+              <a:t>SOI1</a:t>
+            </a:r>
+          </a:p>
+        </p:txBody>
+      </p:sp>
+      <p:sp>
+        <p:nvSpPr>
+          <p:cNvPr id="15" name="Rectangle 14">
+            <a:extLst>
+              <a:ext uri="{FF2B5EF4-FFF2-40B4-BE49-F238E27FC236}">
+                <a16:creationId xmlns:a16="http://schemas.microsoft.com/office/drawing/2014/main" id="{6305BBB9-0BC7-A8A4-108B-A3DE3BEFFA60}"/>
+              </a:ext>
+            </a:extLst>
+          </p:cNvPr>
+          <p:cNvSpPr/>
+          <p:nvPr/>
+        </p:nvSpPr>
+        <p:spPr>
+          <a:xfrm>
+            <a:off x="2946495" y="5301363"/>
+            <a:ext cx="4957888" cy="342786"/>
+          </a:xfrm>
+          <a:prstGeom prst="rect">
+            <a:avLst/>
+          </a:prstGeom>
+          <a:solidFill>
+            <a:schemeClr val="accent2">
+              <a:lumMod val="40000"/>
+              <a:lumOff val="60000"/>
+            </a:schemeClr>
+          </a:solidFill>
+          <a:ln w="6350">
+            <a:solidFill>
+              <a:schemeClr val="tx1"/>
+            </a:solidFill>
+          </a:ln>
+        </p:spPr>
+        <p:style>
+          <a:lnRef idx="2">
+            <a:schemeClr val="accent1">
+              <a:shade val="50000"/>
+            </a:schemeClr>
+          </a:lnRef>
+          <a:fillRef idx="1">
+            <a:schemeClr val="accent1"/>
+          </a:fillRef>
+          <a:effectRef idx="0">
+            <a:schemeClr val="accent1"/>
+          </a:effectRef>
+          <a:fontRef idx="minor">
+            <a:schemeClr val="lt1"/>
+          </a:fontRef>
+        </p:style>
+        <p:txBody>
+          <a:bodyPr rtlCol="0" anchor="ctr"/>
+          <a:lstStyle/>
+          <a:p>
+            <a:pPr algn="ctr"/>
+            <a:r>
+              <a:rPr lang="en-US" sz="1600" dirty="0">
+                <a:solidFill>
+                  <a:schemeClr val="tx1"/>
+                </a:solidFill>
+                <a:latin typeface="Arial" panose="020B0604020202020204" pitchFamily="34" charset="0"/>
+                <a:cs typeface="Arial" panose="020B0604020202020204" pitchFamily="34" charset="0"/>
+              </a:rPr>
+              <a:t>POLY1</a:t>
+            </a:r>
+          </a:p>
+        </p:txBody>
+      </p:sp>
+      <p:sp>
+        <p:nvSpPr>
+          <p:cNvPr id="16" name="Rectangle 15">
+            <a:extLst>
+              <a:ext uri="{FF2B5EF4-FFF2-40B4-BE49-F238E27FC236}">
+                <a16:creationId xmlns:a16="http://schemas.microsoft.com/office/drawing/2014/main" id="{3B7128AE-0B41-9A65-4DB5-87A1E89241E7}"/>
+              </a:ext>
+            </a:extLst>
+          </p:cNvPr>
+          <p:cNvSpPr/>
+          <p:nvPr/>
+        </p:nvSpPr>
+        <p:spPr>
+          <a:xfrm>
+            <a:off x="2946495" y="5644149"/>
+            <a:ext cx="4957888" cy="220455"/>
+          </a:xfrm>
+          <a:prstGeom prst="rect">
+            <a:avLst/>
+          </a:prstGeom>
+          <a:solidFill>
+            <a:schemeClr val="accent6">
+              <a:lumMod val="40000"/>
+              <a:lumOff val="60000"/>
+            </a:schemeClr>
+          </a:solidFill>
+          <a:ln w="6350">
+            <a:solidFill>
+              <a:schemeClr val="tx1"/>
+            </a:solidFill>
+          </a:ln>
+        </p:spPr>
+        <p:style>
+          <a:lnRef idx="2">
+            <a:schemeClr val="accent1">
+              <a:shade val="50000"/>
+            </a:schemeClr>
+          </a:lnRef>
+          <a:fillRef idx="1">
+            <a:schemeClr val="accent1"/>
+          </a:fillRef>
+          <a:effectRef idx="0">
+            <a:schemeClr val="accent1"/>
+          </a:effectRef>
+          <a:fontRef idx="minor">
+            <a:schemeClr val="lt1"/>
+          </a:fontRef>
+        </p:style>
+        <p:txBody>
+          <a:bodyPr rtlCol="0" anchor="ctr"/>
+          <a:lstStyle/>
+          <a:p>
+            <a:pPr algn="ctr"/>
+            <a:r>
+              <a:rPr lang="en-US" sz="1600" dirty="0">
+                <a:solidFill>
+                  <a:schemeClr val="tx1"/>
+                </a:solidFill>
+                <a:latin typeface="Arial" panose="020B0604020202020204" pitchFamily="34" charset="0"/>
+                <a:cs typeface="Arial" panose="020B0604020202020204" pitchFamily="34" charset="0"/>
+              </a:rPr>
+              <a:t>NITRIDE</a:t>
+            </a:r>
+          </a:p>
+        </p:txBody>
+      </p:sp>
+      <p:sp>
+        <p:nvSpPr>
+          <p:cNvPr id="17" name="Rectangle 16">
+            <a:extLst>
+              <a:ext uri="{FF2B5EF4-FFF2-40B4-BE49-F238E27FC236}">
+                <a16:creationId xmlns:a16="http://schemas.microsoft.com/office/drawing/2014/main" id="{DE0219E4-19F1-38F7-FFFF-7B4FCFE2B0E4}"/>
+              </a:ext>
+            </a:extLst>
+          </p:cNvPr>
+          <p:cNvSpPr/>
+          <p:nvPr/>
+        </p:nvSpPr>
+        <p:spPr>
+          <a:xfrm>
+            <a:off x="2946495" y="4958577"/>
+            <a:ext cx="4957888" cy="342786"/>
+          </a:xfrm>
+          <a:prstGeom prst="rect">
+            <a:avLst/>
+          </a:prstGeom>
+          <a:solidFill>
+            <a:schemeClr val="accent4">
+              <a:lumMod val="40000"/>
+              <a:lumOff val="60000"/>
+            </a:schemeClr>
+          </a:solidFill>
+          <a:ln w="6350">
+            <a:solidFill>
+              <a:schemeClr val="tx1"/>
+            </a:solidFill>
+          </a:ln>
+        </p:spPr>
+        <p:style>
+          <a:lnRef idx="2">
+            <a:schemeClr val="accent1">
+              <a:shade val="50000"/>
+            </a:schemeClr>
+          </a:lnRef>
+          <a:fillRef idx="1">
+            <a:schemeClr val="accent1"/>
+          </a:fillRef>
+          <a:effectRef idx="0">
+            <a:schemeClr val="accent1"/>
+          </a:effectRef>
+          <a:fontRef idx="minor">
+            <a:schemeClr val="lt1"/>
+          </a:fontRef>
+        </p:style>
+        <p:txBody>
+          <a:bodyPr rtlCol="0" anchor="ctr"/>
+          <a:lstStyle/>
+          <a:p>
+            <a:pPr algn="ctr"/>
+            <a:r>
+              <a:rPr lang="en-US" sz="1600" dirty="0">
+                <a:solidFill>
+                  <a:schemeClr val="tx1"/>
+                </a:solidFill>
+                <a:latin typeface="Arial" panose="020B0604020202020204" pitchFamily="34" charset="0"/>
+                <a:cs typeface="Arial" panose="020B0604020202020204" pitchFamily="34" charset="0"/>
+              </a:rPr>
+              <a:t>METAL1</a:t>
+            </a:r>
+          </a:p>
+        </p:txBody>
+      </p:sp>
+      <p:sp>
+        <p:nvSpPr>
+          <p:cNvPr id="18" name="Rectangle 17">
+            <a:extLst>
+              <a:ext uri="{FF2B5EF4-FFF2-40B4-BE49-F238E27FC236}">
+                <a16:creationId xmlns:a16="http://schemas.microsoft.com/office/drawing/2014/main" id="{12DF26D4-0086-E65E-6C22-7F8A84569213}"/>
+              </a:ext>
+            </a:extLst>
+          </p:cNvPr>
+          <p:cNvSpPr/>
+          <p:nvPr/>
+        </p:nvSpPr>
+        <p:spPr>
+          <a:xfrm>
+            <a:off x="2946495" y="4615791"/>
+            <a:ext cx="4957888" cy="342786"/>
+          </a:xfrm>
+          <a:prstGeom prst="rect">
+            <a:avLst/>
+          </a:prstGeom>
+          <a:solidFill>
+            <a:schemeClr val="accent4">
+              <a:lumMod val="40000"/>
+              <a:lumOff val="60000"/>
+            </a:schemeClr>
+          </a:solidFill>
+          <a:ln w="6350">
+            <a:solidFill>
+              <a:schemeClr val="tx1"/>
+            </a:solidFill>
+          </a:ln>
+        </p:spPr>
+        <p:style>
+          <a:lnRef idx="2">
+            <a:schemeClr val="accent1">
+              <a:shade val="50000"/>
+            </a:schemeClr>
+          </a:lnRef>
+          <a:fillRef idx="1">
+            <a:schemeClr val="accent1"/>
+          </a:fillRef>
+          <a:effectRef idx="0">
+            <a:schemeClr val="accent1"/>
+          </a:effectRef>
+          <a:fontRef idx="minor">
+            <a:schemeClr val="lt1"/>
+          </a:fontRef>
+        </p:style>
+        <p:txBody>
+          <a:bodyPr rtlCol="0" anchor="ctr"/>
+          <a:lstStyle/>
+          <a:p>
+            <a:pPr algn="ctr"/>
+            <a:r>
+              <a:rPr lang="en-US" sz="1600" dirty="0">
+                <a:solidFill>
+                  <a:schemeClr val="tx1"/>
+                </a:solidFill>
+                <a:latin typeface="Arial" panose="020B0604020202020204" pitchFamily="34" charset="0"/>
+                <a:cs typeface="Arial" panose="020B0604020202020204" pitchFamily="34" charset="0"/>
+              </a:rPr>
+              <a:t>METAL2</a:t>
+            </a:r>
+          </a:p>
+        </p:txBody>
+      </p:sp>
+      <p:sp>
+        <p:nvSpPr>
+          <p:cNvPr id="19" name="Rectangle 18">
+            <a:extLst>
+              <a:ext uri="{FF2B5EF4-FFF2-40B4-BE49-F238E27FC236}">
+                <a16:creationId xmlns:a16="http://schemas.microsoft.com/office/drawing/2014/main" id="{8808B27E-383F-15E5-C712-C4430416AADB}"/>
+              </a:ext>
+            </a:extLst>
+          </p:cNvPr>
+          <p:cNvSpPr/>
+          <p:nvPr/>
+        </p:nvSpPr>
+        <p:spPr>
+          <a:xfrm>
+            <a:off x="2946495" y="4273005"/>
+            <a:ext cx="4957888" cy="342786"/>
+          </a:xfrm>
+          <a:prstGeom prst="rect">
+            <a:avLst/>
+          </a:prstGeom>
+          <a:solidFill>
+            <a:schemeClr val="accent2">
+              <a:lumMod val="40000"/>
+              <a:lumOff val="60000"/>
+            </a:schemeClr>
+          </a:solidFill>
+          <a:ln w="6350">
+            <a:solidFill>
+              <a:schemeClr val="tx1"/>
+            </a:solidFill>
+          </a:ln>
+        </p:spPr>
+        <p:style>
+          <a:lnRef idx="2">
+            <a:schemeClr val="accent1">
+              <a:shade val="50000"/>
+            </a:schemeClr>
+          </a:lnRef>
+          <a:fillRef idx="1">
+            <a:schemeClr val="accent1"/>
+          </a:fillRef>
+          <a:effectRef idx="0">
+            <a:schemeClr val="accent1"/>
+          </a:effectRef>
+          <a:fontRef idx="minor">
+            <a:schemeClr val="lt1"/>
+          </a:fontRef>
+        </p:style>
+        <p:txBody>
+          <a:bodyPr rtlCol="0" anchor="ctr"/>
+          <a:lstStyle/>
+          <a:p>
+            <a:pPr algn="ctr"/>
+            <a:r>
+              <a:rPr lang="en-US" sz="1600" dirty="0">
+                <a:solidFill>
+                  <a:schemeClr val="tx1"/>
+                </a:solidFill>
+                <a:latin typeface="Arial" panose="020B0604020202020204" pitchFamily="34" charset="0"/>
+                <a:cs typeface="Arial" panose="020B0604020202020204" pitchFamily="34" charset="0"/>
+              </a:rPr>
+              <a:t>POLY2</a:t>
+            </a:r>
+          </a:p>
+        </p:txBody>
+      </p:sp>
+      <p:sp>
+        <p:nvSpPr>
+          <p:cNvPr id="20" name="Rectangle 19">
+            <a:extLst>
+              <a:ext uri="{FF2B5EF4-FFF2-40B4-BE49-F238E27FC236}">
+                <a16:creationId xmlns:a16="http://schemas.microsoft.com/office/drawing/2014/main" id="{28BA6E9B-50A8-4B15-1335-66233310297C}"/>
+              </a:ext>
+            </a:extLst>
+          </p:cNvPr>
+          <p:cNvSpPr/>
+          <p:nvPr/>
+        </p:nvSpPr>
+        <p:spPr>
+          <a:xfrm>
+            <a:off x="2946495" y="4052550"/>
+            <a:ext cx="4957888" cy="220455"/>
+          </a:xfrm>
+          <a:prstGeom prst="rect">
+            <a:avLst/>
+          </a:prstGeom>
+          <a:solidFill>
+            <a:schemeClr val="accent6">
+              <a:lumMod val="40000"/>
+              <a:lumOff val="60000"/>
+            </a:schemeClr>
+          </a:solidFill>
+          <a:ln w="6350">
+            <a:solidFill>
+              <a:schemeClr val="tx1"/>
+            </a:solidFill>
+          </a:ln>
+        </p:spPr>
+        <p:style>
+          <a:lnRef idx="2">
+            <a:schemeClr val="accent1">
+              <a:shade val="50000"/>
+            </a:schemeClr>
+          </a:lnRef>
+          <a:fillRef idx="1">
+            <a:schemeClr val="accent1"/>
+          </a:fillRef>
+          <a:effectRef idx="0">
+            <a:schemeClr val="accent1"/>
+          </a:effectRef>
+          <a:fontRef idx="minor">
+            <a:schemeClr val="lt1"/>
+          </a:fontRef>
+        </p:style>
+        <p:txBody>
+          <a:bodyPr rtlCol="0" anchor="ctr"/>
+          <a:lstStyle/>
+          <a:p>
+            <a:pPr algn="ctr"/>
+            <a:r>
+              <a:rPr lang="en-US" sz="1600" dirty="0">
+                <a:solidFill>
+                  <a:schemeClr val="tx1"/>
+                </a:solidFill>
+                <a:latin typeface="Arial" panose="020B0604020202020204" pitchFamily="34" charset="0"/>
+                <a:cs typeface="Arial" panose="020B0604020202020204" pitchFamily="34" charset="0"/>
+              </a:rPr>
+              <a:t>NITRIDE</a:t>
+            </a:r>
+          </a:p>
+        </p:txBody>
+      </p:sp>
+      <p:sp>
+        <p:nvSpPr>
+          <p:cNvPr id="21" name="Rectangle 20">
+            <a:extLst>
+              <a:ext uri="{FF2B5EF4-FFF2-40B4-BE49-F238E27FC236}">
+                <a16:creationId xmlns:a16="http://schemas.microsoft.com/office/drawing/2014/main" id="{E42547EF-7009-67E0-47E4-89E97534ED01}"/>
+              </a:ext>
+            </a:extLst>
+          </p:cNvPr>
+          <p:cNvSpPr/>
+          <p:nvPr/>
+        </p:nvSpPr>
+        <p:spPr>
+          <a:xfrm>
+            <a:off x="2946494" y="3432534"/>
+            <a:ext cx="4957889" cy="620016"/>
+          </a:xfrm>
+          <a:prstGeom prst="rect">
+            <a:avLst/>
+          </a:prstGeom>
+          <a:solidFill>
+            <a:schemeClr val="accent3">
+              <a:lumMod val="40000"/>
+              <a:lumOff val="60000"/>
+            </a:schemeClr>
+          </a:solidFill>
+          <a:ln w="6350">
+            <a:solidFill>
+              <a:schemeClr val="tx1"/>
+            </a:solidFill>
+          </a:ln>
+        </p:spPr>
+        <p:style>
+          <a:lnRef idx="2">
+            <a:schemeClr val="accent1">
+              <a:shade val="50000"/>
+            </a:schemeClr>
+          </a:lnRef>
+          <a:fillRef idx="1">
+            <a:schemeClr val="accent1"/>
+          </a:fillRef>
+          <a:effectRef idx="0">
+            <a:schemeClr val="accent1"/>
+          </a:effectRef>
+          <a:fontRef idx="minor">
+            <a:schemeClr val="lt1"/>
+          </a:fontRef>
+        </p:style>
+        <p:txBody>
+          <a:bodyPr rtlCol="0" anchor="ctr"/>
+          <a:lstStyle/>
+          <a:p>
+            <a:pPr algn="ctr"/>
+            <a:r>
+              <a:rPr lang="en-US" dirty="0">
+                <a:solidFill>
+                  <a:schemeClr val="tx1"/>
+                </a:solidFill>
+                <a:latin typeface="Arial" panose="020B0604020202020204" pitchFamily="34" charset="0"/>
+                <a:cs typeface="Arial" panose="020B0604020202020204" pitchFamily="34" charset="0"/>
+              </a:rPr>
+              <a:t>SOI2</a:t>
+            </a:r>
+          </a:p>
+        </p:txBody>
+      </p:sp>
+      <p:sp>
+        <p:nvSpPr>
+          <p:cNvPr id="22" name="Arrow: Curved Down 21">
+            <a:extLst>
+              <a:ext uri="{FF2B5EF4-FFF2-40B4-BE49-F238E27FC236}">
+                <a16:creationId xmlns:a16="http://schemas.microsoft.com/office/drawing/2014/main" id="{0D0EE05A-457E-CC9B-7FED-8B618F653922}"/>
+              </a:ext>
+            </a:extLst>
+          </p:cNvPr>
+          <p:cNvSpPr/>
+          <p:nvPr/>
+        </p:nvSpPr>
+        <p:spPr>
+          <a:xfrm flipH="1">
+            <a:off x="4876800" y="528377"/>
+            <a:ext cx="1117600" cy="397931"/>
+          </a:xfrm>
+          <a:prstGeom prst="curvedDownArrow">
+            <a:avLst/>
+          </a:prstGeom>
+          <a:solidFill>
+            <a:srgbClr val="00B0F0"/>
+          </a:solidFill>
+          <a:ln w="6350">
+            <a:solidFill>
+              <a:schemeClr val="tx2"/>
+            </a:solidFill>
+          </a:ln>
+        </p:spPr>
+        <p:style>
+          <a:lnRef idx="2">
+            <a:schemeClr val="accent1">
+              <a:shade val="50000"/>
+            </a:schemeClr>
+          </a:lnRef>
+          <a:fillRef idx="1">
+            <a:schemeClr val="accent1"/>
+          </a:fillRef>
+          <a:effectRef idx="0">
+            <a:schemeClr val="accent1"/>
+          </a:effectRef>
+          <a:fontRef idx="minor">
+            <a:schemeClr val="lt1"/>
+          </a:fontRef>
+        </p:style>
+        <p:txBody>
+          <a:bodyPr rtlCol="0" anchor="ctr"/>
+          <a:lstStyle/>
+          <a:p>
+            <a:pPr algn="ctr"/>
+            <a:endParaRPr lang="en-US">
+              <a:solidFill>
+                <a:schemeClr val="tx1"/>
+              </a:solidFill>
+            </a:endParaRPr>
+          </a:p>
+        </p:txBody>
+      </p:sp>
+      <p:sp>
+        <p:nvSpPr>
+          <p:cNvPr id="23" name="Arrow: Down 22">
+            <a:extLst>
+              <a:ext uri="{FF2B5EF4-FFF2-40B4-BE49-F238E27FC236}">
+                <a16:creationId xmlns:a16="http://schemas.microsoft.com/office/drawing/2014/main" id="{8461E907-0F73-4B2B-FD3B-BD18D6E21FF5}"/>
+              </a:ext>
+            </a:extLst>
+          </p:cNvPr>
+          <p:cNvSpPr/>
+          <p:nvPr/>
+        </p:nvSpPr>
+        <p:spPr>
+          <a:xfrm>
+            <a:off x="5334698" y="2834495"/>
+            <a:ext cx="181484" cy="397931"/>
+          </a:xfrm>
+          <a:prstGeom prst="downArrow">
+            <a:avLst/>
+          </a:prstGeom>
+          <a:solidFill>
+            <a:srgbClr val="00B0F0"/>
+          </a:solidFill>
+          <a:ln w="6350">
+            <a:solidFill>
+              <a:schemeClr val="tx2"/>
+            </a:solidFill>
+          </a:ln>
+        </p:spPr>
+        <p:style>
+          <a:lnRef idx="2">
+            <a:schemeClr val="accent1">
+              <a:shade val="50000"/>
+            </a:schemeClr>
+          </a:lnRef>
+          <a:fillRef idx="1">
+            <a:schemeClr val="accent1"/>
+          </a:fillRef>
+          <a:effectRef idx="0">
+            <a:schemeClr val="accent1"/>
+          </a:effectRef>
+          <a:fontRef idx="minor">
+            <a:schemeClr val="lt1"/>
+          </a:fontRef>
+        </p:style>
+        <p:txBody>
+          <a:bodyPr rtlCol="0" anchor="ctr"/>
+          <a:lstStyle/>
+          <a:p>
+            <a:pPr algn="ctr"/>
+            <a:endParaRPr lang="en-US">
+              <a:solidFill>
+                <a:schemeClr val="tx1"/>
+              </a:solidFill>
+            </a:endParaRPr>
+          </a:p>
+        </p:txBody>
+      </p:sp>
+      <p:cxnSp>
+        <p:nvCxnSpPr>
+          <p:cNvPr id="24" name="Straight Arrow Connector 23">
+            <a:extLst>
+              <a:ext uri="{FF2B5EF4-FFF2-40B4-BE49-F238E27FC236}">
+                <a16:creationId xmlns:a16="http://schemas.microsoft.com/office/drawing/2014/main" id="{866AE517-1FB6-46D8-E465-BC05C136842E}"/>
+              </a:ext>
+            </a:extLst>
+          </p:cNvPr>
+          <p:cNvCxnSpPr>
+            <a:cxnSpLocks/>
+          </p:cNvCxnSpPr>
+          <p:nvPr/>
+        </p:nvCxnSpPr>
+        <p:spPr>
+          <a:xfrm>
+            <a:off x="10701826" y="1705310"/>
+            <a:ext cx="0" cy="840471"/>
+          </a:xfrm>
+          <a:prstGeom prst="straightConnector1">
+            <a:avLst/>
+          </a:prstGeom>
+          <a:ln>
+            <a:solidFill>
+              <a:schemeClr val="tx1"/>
+            </a:solidFill>
+            <a:headEnd type="triangle"/>
+            <a:tailEnd type="triangle"/>
+          </a:ln>
+        </p:spPr>
+        <p:style>
+          <a:lnRef idx="1">
+            <a:schemeClr val="accent1"/>
+          </a:lnRef>
+          <a:fillRef idx="0">
+            <a:schemeClr val="accent1"/>
+          </a:fillRef>
+          <a:effectRef idx="0">
+            <a:schemeClr val="accent1"/>
+          </a:effectRef>
+          <a:fontRef idx="minor">
+            <a:schemeClr val="tx1"/>
+          </a:fontRef>
+        </p:style>
+      </p:cxnSp>
+      <p:cxnSp>
+        <p:nvCxnSpPr>
+          <p:cNvPr id="25" name="Straight Arrow Connector 24">
+            <a:extLst>
+              <a:ext uri="{FF2B5EF4-FFF2-40B4-BE49-F238E27FC236}">
+                <a16:creationId xmlns:a16="http://schemas.microsoft.com/office/drawing/2014/main" id="{4AA58C72-1411-290D-0278-BFE77365D63B}"/>
+              </a:ext>
+            </a:extLst>
+          </p:cNvPr>
+          <p:cNvCxnSpPr>
+            <a:cxnSpLocks/>
+          </p:cNvCxnSpPr>
+          <p:nvPr/>
+        </p:nvCxnSpPr>
+        <p:spPr>
+          <a:xfrm>
+            <a:off x="8082736" y="3429000"/>
+            <a:ext cx="0" cy="3055620"/>
+          </a:xfrm>
+          <a:prstGeom prst="straightConnector1">
+            <a:avLst/>
+          </a:prstGeom>
+          <a:ln>
+            <a:solidFill>
+              <a:schemeClr val="tx1"/>
+            </a:solidFill>
+            <a:headEnd type="triangle"/>
+            <a:tailEnd type="triangle"/>
+          </a:ln>
+        </p:spPr>
+        <p:style>
+          <a:lnRef idx="1">
+            <a:schemeClr val="accent1"/>
+          </a:lnRef>
+          <a:fillRef idx="0">
+            <a:schemeClr val="accent1"/>
+          </a:fillRef>
+          <a:effectRef idx="0">
+            <a:schemeClr val="accent1"/>
+          </a:effectRef>
+          <a:fontRef idx="minor">
+            <a:schemeClr val="tx1"/>
+          </a:fontRef>
+        </p:style>
+      </p:cxnSp>
+      <p:sp>
+        <p:nvSpPr>
+          <p:cNvPr id="26" name="TextBox 25">
+            <a:extLst>
+              <a:ext uri="{FF2B5EF4-FFF2-40B4-BE49-F238E27FC236}">
+                <a16:creationId xmlns:a16="http://schemas.microsoft.com/office/drawing/2014/main" id="{5BC3213A-DA13-F4ED-3511-FF91C6DA9354}"/>
+              </a:ext>
+            </a:extLst>
+          </p:cNvPr>
+          <p:cNvSpPr txBox="1"/>
+          <p:nvPr/>
+        </p:nvSpPr>
+        <p:spPr>
+          <a:xfrm>
+            <a:off x="8136583" y="4772144"/>
+            <a:ext cx="1193762" cy="369332"/>
+          </a:xfrm>
+          <a:prstGeom prst="rect">
+            <a:avLst/>
+          </a:prstGeom>
+          <a:noFill/>
+        </p:spPr>
+        <p:txBody>
+          <a:bodyPr wrap="square" rtlCol="0">
+            <a:spAutoFit/>
+          </a:bodyPr>
+          <a:lstStyle/>
+          <a:p>
+            <a:r>
+              <a:rPr lang="en-US" dirty="0">
+                <a:latin typeface="Arial" panose="020B0604020202020204" pitchFamily="34" charset="0"/>
+                <a:cs typeface="Arial" panose="020B0604020202020204" pitchFamily="34" charset="0"/>
+              </a:rPr>
+              <a:t>82.7 µm</a:t>
+            </a:r>
+          </a:p>
+        </p:txBody>
+      </p:sp>
+      <p:sp>
+        <p:nvSpPr>
+          <p:cNvPr id="27" name="TextBox 26">
+            <a:extLst>
+              <a:ext uri="{FF2B5EF4-FFF2-40B4-BE49-F238E27FC236}">
+                <a16:creationId xmlns:a16="http://schemas.microsoft.com/office/drawing/2014/main" id="{189B6AC1-02A0-6CA9-8030-82CB6BBB4BDA}"/>
+              </a:ext>
+            </a:extLst>
+          </p:cNvPr>
+          <p:cNvSpPr txBox="1"/>
+          <p:nvPr/>
+        </p:nvSpPr>
+        <p:spPr>
+          <a:xfrm>
+            <a:off x="9195592" y="2821868"/>
+            <a:ext cx="1463370" cy="369332"/>
+          </a:xfrm>
+          <a:prstGeom prst="rect">
+            <a:avLst/>
+          </a:prstGeom>
+          <a:noFill/>
+        </p:spPr>
+        <p:txBody>
+          <a:bodyPr wrap="square" rtlCol="0">
+            <a:spAutoFit/>
+          </a:bodyPr>
+          <a:lstStyle/>
+          <a:p>
+            <a:pPr algn="ctr"/>
+            <a:r>
+              <a:rPr lang="en-US" dirty="0">
+                <a:latin typeface="Arial" panose="020B0604020202020204" pitchFamily="34" charset="0"/>
+                <a:cs typeface="Arial" panose="020B0604020202020204" pitchFamily="34" charset="0"/>
+              </a:rPr>
+              <a:t>a = 40.2 µm</a:t>
+            </a:r>
+          </a:p>
+        </p:txBody>
+      </p:sp>
+      <p:cxnSp>
+        <p:nvCxnSpPr>
+          <p:cNvPr id="28" name="Straight Arrow Connector 27">
+            <a:extLst>
+              <a:ext uri="{FF2B5EF4-FFF2-40B4-BE49-F238E27FC236}">
+                <a16:creationId xmlns:a16="http://schemas.microsoft.com/office/drawing/2014/main" id="{2F55025D-B199-3745-BDB5-79EBAA71F1CC}"/>
+              </a:ext>
+            </a:extLst>
+          </p:cNvPr>
+          <p:cNvCxnSpPr>
+            <a:cxnSpLocks/>
+          </p:cNvCxnSpPr>
+          <p:nvPr/>
+        </p:nvCxnSpPr>
+        <p:spPr>
+          <a:xfrm>
+            <a:off x="10899946" y="1362524"/>
+            <a:ext cx="0" cy="1183257"/>
+          </a:xfrm>
+          <a:prstGeom prst="straightConnector1">
+            <a:avLst/>
+          </a:prstGeom>
+          <a:ln>
+            <a:solidFill>
+              <a:schemeClr val="tx1"/>
+            </a:solidFill>
+            <a:headEnd type="triangle"/>
+            <a:tailEnd type="triangle"/>
+          </a:ln>
+        </p:spPr>
+        <p:style>
+          <a:lnRef idx="1">
+            <a:schemeClr val="accent1"/>
+          </a:lnRef>
+          <a:fillRef idx="0">
+            <a:schemeClr val="accent1"/>
+          </a:fillRef>
+          <a:effectRef idx="0">
+            <a:schemeClr val="accent1"/>
+          </a:effectRef>
+          <a:fontRef idx="minor">
+            <a:schemeClr val="tx1"/>
+          </a:fontRef>
+        </p:style>
+      </p:cxnSp>
+      <p:cxnSp>
+        <p:nvCxnSpPr>
+          <p:cNvPr id="29" name="Straight Arrow Connector 28">
+            <a:extLst>
+              <a:ext uri="{FF2B5EF4-FFF2-40B4-BE49-F238E27FC236}">
+                <a16:creationId xmlns:a16="http://schemas.microsoft.com/office/drawing/2014/main" id="{1F4CDDED-DA5D-20C5-B178-2D5A0F45E9E3}"/>
+              </a:ext>
+            </a:extLst>
+          </p:cNvPr>
+          <p:cNvCxnSpPr>
+            <a:cxnSpLocks/>
+          </p:cNvCxnSpPr>
+          <p:nvPr/>
+        </p:nvCxnSpPr>
+        <p:spPr>
+          <a:xfrm>
+            <a:off x="11122196" y="1019738"/>
+            <a:ext cx="0" cy="1526042"/>
+          </a:xfrm>
+          <a:prstGeom prst="straightConnector1">
+            <a:avLst/>
+          </a:prstGeom>
+          <a:ln>
+            <a:solidFill>
+              <a:schemeClr val="tx1"/>
+            </a:solidFill>
+            <a:headEnd type="triangle"/>
+            <a:tailEnd type="triangle"/>
+          </a:ln>
+        </p:spPr>
+        <p:style>
+          <a:lnRef idx="1">
+            <a:schemeClr val="accent1"/>
+          </a:lnRef>
+          <a:fillRef idx="0">
+            <a:schemeClr val="accent1"/>
+          </a:fillRef>
+          <a:effectRef idx="0">
+            <a:schemeClr val="accent1"/>
+          </a:effectRef>
+          <a:fontRef idx="minor">
+            <a:schemeClr val="tx1"/>
+          </a:fontRef>
+        </p:style>
+      </p:cxnSp>
+      <p:sp>
+        <p:nvSpPr>
+          <p:cNvPr id="30" name="TextBox 29">
+            <a:extLst>
+              <a:ext uri="{FF2B5EF4-FFF2-40B4-BE49-F238E27FC236}">
+                <a16:creationId xmlns:a16="http://schemas.microsoft.com/office/drawing/2014/main" id="{24E8308E-E2AD-D2FF-9312-F221A66DD017}"/>
+              </a:ext>
+            </a:extLst>
+          </p:cNvPr>
+          <p:cNvSpPr txBox="1"/>
+          <p:nvPr/>
+        </p:nvSpPr>
+        <p:spPr>
+          <a:xfrm>
+            <a:off x="9195592" y="3214678"/>
+            <a:ext cx="1463370" cy="369332"/>
+          </a:xfrm>
+          <a:prstGeom prst="rect">
+            <a:avLst/>
+          </a:prstGeom>
+          <a:noFill/>
+        </p:spPr>
+        <p:txBody>
+          <a:bodyPr wrap="square" rtlCol="0">
+            <a:spAutoFit/>
+          </a:bodyPr>
+          <a:lstStyle/>
+          <a:p>
+            <a:pPr algn="ctr"/>
+            <a:r>
+              <a:rPr lang="en-US" dirty="0">
+                <a:latin typeface="Arial" panose="020B0604020202020204" pitchFamily="34" charset="0"/>
+                <a:cs typeface="Arial" panose="020B0604020202020204" pitchFamily="34" charset="0"/>
+              </a:rPr>
+              <a:t>b = 40.7 µm</a:t>
+            </a:r>
+          </a:p>
+        </p:txBody>
+      </p:sp>
+      <p:sp>
+        <p:nvSpPr>
+          <p:cNvPr id="31" name="TextBox 30">
+            <a:extLst>
+              <a:ext uri="{FF2B5EF4-FFF2-40B4-BE49-F238E27FC236}">
+                <a16:creationId xmlns:a16="http://schemas.microsoft.com/office/drawing/2014/main" id="{1FEE72D1-678E-14DC-6291-AB6E34C73411}"/>
+              </a:ext>
+            </a:extLst>
+          </p:cNvPr>
+          <p:cNvSpPr txBox="1"/>
+          <p:nvPr/>
+        </p:nvSpPr>
+        <p:spPr>
+          <a:xfrm>
+            <a:off x="9195592" y="3601039"/>
+            <a:ext cx="1589554" cy="369332"/>
+          </a:xfrm>
+          <a:prstGeom prst="rect">
+            <a:avLst/>
+          </a:prstGeom>
+          <a:noFill/>
+        </p:spPr>
+        <p:txBody>
+          <a:bodyPr wrap="square" rtlCol="0">
+            <a:spAutoFit/>
+          </a:bodyPr>
+          <a:lstStyle/>
+          <a:p>
+            <a:pPr algn="ctr"/>
+            <a:r>
+              <a:rPr lang="en-US" dirty="0">
+                <a:latin typeface="Arial" panose="020B0604020202020204" pitchFamily="34" charset="0"/>
+                <a:cs typeface="Arial" panose="020B0604020202020204" pitchFamily="34" charset="0"/>
+              </a:rPr>
+              <a:t>c = 41.35 µm</a:t>
+            </a:r>
+          </a:p>
+        </p:txBody>
+      </p:sp>
+      <p:sp>
+        <p:nvSpPr>
+          <p:cNvPr id="32" name="TextBox 31">
+            <a:extLst>
+              <a:ext uri="{FF2B5EF4-FFF2-40B4-BE49-F238E27FC236}">
+                <a16:creationId xmlns:a16="http://schemas.microsoft.com/office/drawing/2014/main" id="{EFDCE0A0-5B42-C70E-96A1-4B901402EF96}"/>
+              </a:ext>
+            </a:extLst>
+          </p:cNvPr>
+          <p:cNvSpPr txBox="1"/>
+          <p:nvPr/>
+        </p:nvSpPr>
+        <p:spPr>
+          <a:xfrm>
+            <a:off x="10403517" y="1968397"/>
+            <a:ext cx="405151" cy="338554"/>
+          </a:xfrm>
+          <a:prstGeom prst="rect">
+            <a:avLst/>
+          </a:prstGeom>
+          <a:noFill/>
+        </p:spPr>
+        <p:txBody>
+          <a:bodyPr wrap="square" rtlCol="0">
+            <a:spAutoFit/>
+          </a:bodyPr>
+          <a:lstStyle/>
+          <a:p>
+            <a:pPr algn="ctr"/>
+            <a:r>
+              <a:rPr lang="en-US" sz="1600" dirty="0">
+                <a:latin typeface="Arial" panose="020B0604020202020204" pitchFamily="34" charset="0"/>
+                <a:cs typeface="Arial" panose="020B0604020202020204" pitchFamily="34" charset="0"/>
+              </a:rPr>
+              <a:t>a</a:t>
+            </a:r>
+          </a:p>
+        </p:txBody>
+      </p:sp>
+      <p:sp>
+        <p:nvSpPr>
+          <p:cNvPr id="33" name="TextBox 32">
+            <a:extLst>
+              <a:ext uri="{FF2B5EF4-FFF2-40B4-BE49-F238E27FC236}">
+                <a16:creationId xmlns:a16="http://schemas.microsoft.com/office/drawing/2014/main" id="{889FC60D-382B-91E3-F7B5-A2CDEB414A96}"/>
+              </a:ext>
+            </a:extLst>
+          </p:cNvPr>
+          <p:cNvSpPr txBox="1"/>
+          <p:nvPr/>
+        </p:nvSpPr>
+        <p:spPr>
+          <a:xfrm>
+            <a:off x="10625144" y="1968397"/>
+            <a:ext cx="405151" cy="338554"/>
+          </a:xfrm>
+          <a:prstGeom prst="rect">
+            <a:avLst/>
+          </a:prstGeom>
+          <a:noFill/>
+        </p:spPr>
+        <p:txBody>
+          <a:bodyPr wrap="square" rtlCol="0">
+            <a:spAutoFit/>
+          </a:bodyPr>
+          <a:lstStyle/>
+          <a:p>
+            <a:pPr algn="ctr"/>
+            <a:r>
+              <a:rPr lang="en-US" sz="1600" dirty="0">
+                <a:latin typeface="Arial" panose="020B0604020202020204" pitchFamily="34" charset="0"/>
+                <a:cs typeface="Arial" panose="020B0604020202020204" pitchFamily="34" charset="0"/>
+              </a:rPr>
+              <a:t>b</a:t>
+            </a:r>
+          </a:p>
+        </p:txBody>
+      </p:sp>
+      <p:sp>
+        <p:nvSpPr>
+          <p:cNvPr id="34" name="TextBox 33">
+            <a:extLst>
+              <a:ext uri="{FF2B5EF4-FFF2-40B4-BE49-F238E27FC236}">
+                <a16:creationId xmlns:a16="http://schemas.microsoft.com/office/drawing/2014/main" id="{91929013-DEF5-1C8A-FC5B-272C314961D5}"/>
+              </a:ext>
+            </a:extLst>
+          </p:cNvPr>
+          <p:cNvSpPr txBox="1"/>
+          <p:nvPr/>
+        </p:nvSpPr>
+        <p:spPr>
+          <a:xfrm>
+            <a:off x="10830894" y="1968397"/>
+            <a:ext cx="405151" cy="338554"/>
+          </a:xfrm>
+          <a:prstGeom prst="rect">
+            <a:avLst/>
+          </a:prstGeom>
+          <a:noFill/>
+        </p:spPr>
+        <p:txBody>
+          <a:bodyPr wrap="square" rtlCol="0">
+            <a:spAutoFit/>
+          </a:bodyPr>
+          <a:lstStyle/>
+          <a:p>
+            <a:pPr algn="ctr"/>
+            <a:r>
+              <a:rPr lang="en-US" sz="1600" dirty="0">
+                <a:latin typeface="Arial" panose="020B0604020202020204" pitchFamily="34" charset="0"/>
+                <a:cs typeface="Arial" panose="020B0604020202020204" pitchFamily="34" charset="0"/>
+              </a:rPr>
+              <a:t>c</a:t>
+            </a:r>
+          </a:p>
+        </p:txBody>
+      </p:sp>
+    </p:spTree>
+    <p:extLst>
+      <p:ext uri="{BB962C8B-B14F-4D97-AF65-F5344CB8AC3E}">
+        <p14:creationId xmlns:p14="http://schemas.microsoft.com/office/powerpoint/2010/main" val="2845568345"/>
       </p:ext>
     </p:extLst>
   </p:cSld>

</xml_diff>